<commit_message>
Añadida parte de Juan Alberto
</commit_message>
<xml_diff>
--- a/Ejercicio 1 - IIA/Ejercicio 1 IIA.pptx
+++ b/Ejercicio 1 - IIA/Ejercicio 1 IIA.pptx
@@ -5,10 +5,10 @@
     <p:sldMasterId id="2147483672" r:id="rId1"/>
   </p:sldMasterIdLst>
   <p:notesMasterIdLst>
-    <p:notesMasterId r:id="rId26"/>
+    <p:notesMasterId r:id="rId48"/>
   </p:notesMasterIdLst>
   <p:handoutMasterIdLst>
-    <p:handoutMasterId r:id="rId27"/>
+    <p:handoutMasterId r:id="rId49"/>
   </p:handoutMasterIdLst>
   <p:sldIdLst>
     <p:sldId id="256" r:id="rId2"/>
@@ -35,6 +35,28 @@
     <p:sldId id="279" r:id="rId23"/>
     <p:sldId id="271" r:id="rId24"/>
     <p:sldId id="280" r:id="rId25"/>
+    <p:sldId id="281" r:id="rId26"/>
+    <p:sldId id="282" r:id="rId27"/>
+    <p:sldId id="283" r:id="rId28"/>
+    <p:sldId id="284" r:id="rId29"/>
+    <p:sldId id="285" r:id="rId30"/>
+    <p:sldId id="286" r:id="rId31"/>
+    <p:sldId id="287" r:id="rId32"/>
+    <p:sldId id="288" r:id="rId33"/>
+    <p:sldId id="289" r:id="rId34"/>
+    <p:sldId id="290" r:id="rId35"/>
+    <p:sldId id="272" r:id="rId36"/>
+    <p:sldId id="291" r:id="rId37"/>
+    <p:sldId id="292" r:id="rId38"/>
+    <p:sldId id="293" r:id="rId39"/>
+    <p:sldId id="294" r:id="rId40"/>
+    <p:sldId id="295" r:id="rId41"/>
+    <p:sldId id="296" r:id="rId42"/>
+    <p:sldId id="297" r:id="rId43"/>
+    <p:sldId id="298" r:id="rId44"/>
+    <p:sldId id="299" r:id="rId45"/>
+    <p:sldId id="300" r:id="rId46"/>
+    <p:sldId id="301" r:id="rId47"/>
   </p:sldIdLst>
   <p:sldSz cx="12192000" cy="6858000"/>
   <p:notesSz cx="6858000" cy="9144000"/>
@@ -7312,6 +7334,750 @@
 </p:sld>
 </file>
 
+<file path=ppt/slides/slide25.xml><?xml version="1.0" encoding="utf-8"?>
+<p:sld xmlns:a="http://schemas.openxmlformats.org/drawingml/2006/main" xmlns:r="http://schemas.openxmlformats.org/officeDocument/2006/relationships" xmlns:p="http://schemas.openxmlformats.org/presentationml/2006/main">
+  <p:cSld>
+    <p:spTree>
+      <p:nvGrpSpPr>
+        <p:cNvPr id="1" name=""/>
+        <p:cNvGrpSpPr/>
+        <p:nvPr/>
+      </p:nvGrpSpPr>
+      <p:grpSpPr>
+        <a:xfrm>
+          <a:off x="0" y="0"/>
+          <a:ext cx="0" cy="0"/>
+          <a:chOff x="0" y="0"/>
+          <a:chExt cx="0" cy="0"/>
+        </a:xfrm>
+      </p:grpSpPr>
+      <p:sp>
+        <p:nvSpPr>
+          <p:cNvPr id="2" name="Título 1">
+            <a:extLst>
+              <a:ext uri="{FF2B5EF4-FFF2-40B4-BE49-F238E27FC236}">
+                <a16:creationId xmlns:a16="http://schemas.microsoft.com/office/drawing/2014/main" id="{8D692F28-0EB3-DCB5-3631-5C098A06243D}"/>
+              </a:ext>
+            </a:extLst>
+          </p:cNvPr>
+          <p:cNvSpPr>
+            <a:spLocks noGrp="1"/>
+          </p:cNvSpPr>
+          <p:nvPr>
+            <p:ph type="title"/>
+          </p:nvPr>
+        </p:nvSpPr>
+        <p:spPr/>
+        <p:txBody>
+          <a:bodyPr>
+            <a:normAutofit/>
+          </a:bodyPr>
+          <a:lstStyle/>
+          <a:p>
+            <a:r>
+              <a:rPr lang="es-ES" sz="3200" dirty="0" err="1">
+                <a:sym typeface="Wingdings" panose="05000000000000000000" pitchFamily="2" charset="2"/>
+              </a:rPr>
+              <a:t>Replicator</a:t>
+            </a:r>
+            <a:r>
+              <a:rPr lang="es-ES" sz="3200" dirty="0">
+                <a:sym typeface="Wingdings" panose="05000000000000000000" pitchFamily="2" charset="2"/>
+              </a:rPr>
+              <a:t> 2  </a:t>
+            </a:r>
+            <a:r>
+              <a:rPr lang="es-ES" sz="3200" dirty="0" err="1">
+                <a:sym typeface="Wingdings" panose="05000000000000000000" pitchFamily="2" charset="2"/>
+              </a:rPr>
+              <a:t>slimmer</a:t>
+            </a:r>
+            <a:r>
+              <a:rPr lang="es-ES" sz="3200" dirty="0">
+                <a:sym typeface="Wingdings" panose="05000000000000000000" pitchFamily="2" charset="2"/>
+              </a:rPr>
+              <a:t> 4</a:t>
+            </a:r>
+            <a:endParaRPr lang="es-ES" sz="3200" dirty="0"/>
+          </a:p>
+        </p:txBody>
+      </p:sp>
+      <p:sp>
+        <p:nvSpPr>
+          <p:cNvPr id="3" name="Marcador de texto 2">
+            <a:extLst>
+              <a:ext uri="{FF2B5EF4-FFF2-40B4-BE49-F238E27FC236}">
+                <a16:creationId xmlns:a16="http://schemas.microsoft.com/office/drawing/2014/main" id="{5B493C32-E059-9D76-B9C6-68E6600AAD06}"/>
+              </a:ext>
+            </a:extLst>
+          </p:cNvPr>
+          <p:cNvSpPr>
+            <a:spLocks noGrp="1"/>
+          </p:cNvSpPr>
+          <p:nvPr>
+            <p:ph type="body" idx="1"/>
+          </p:nvPr>
+        </p:nvSpPr>
+        <p:spPr/>
+        <p:txBody>
+          <a:bodyPr/>
+          <a:lstStyle/>
+          <a:p>
+            <a:r>
+              <a:rPr lang="es-ES" dirty="0"/>
+              <a:t>Ejemplo de mensaje</a:t>
+            </a:r>
+          </a:p>
+        </p:txBody>
+      </p:sp>
+      <p:pic>
+        <p:nvPicPr>
+          <p:cNvPr id="5" name="Imagen 4" descr="Diagrama, Esquemático&#10;&#10;Descripción generada automáticamente">
+            <a:extLst>
+              <a:ext uri="{FF2B5EF4-FFF2-40B4-BE49-F238E27FC236}">
+                <a16:creationId xmlns:a16="http://schemas.microsoft.com/office/drawing/2014/main" id="{38F597A3-D9AF-6676-1EAE-95546F8B44EC}"/>
+              </a:ext>
+            </a:extLst>
+          </p:cNvPr>
+          <p:cNvPicPr>
+            <a:picLocks noChangeAspect="1"/>
+          </p:cNvPicPr>
+          <p:nvPr/>
+        </p:nvPicPr>
+        <p:blipFill>
+          <a:blip r:embed="rId2"/>
+          <a:stretch>
+            <a:fillRect/>
+          </a:stretch>
+        </p:blipFill>
+        <p:spPr>
+          <a:xfrm>
+            <a:off x="2759243" y="629391"/>
+            <a:ext cx="5983706" cy="3101920"/>
+          </a:xfrm>
+          <a:prstGeom prst="rect">
+            <a:avLst/>
+          </a:prstGeom>
+        </p:spPr>
+      </p:pic>
+    </p:spTree>
+    <p:extLst>
+      <p:ext uri="{BB962C8B-B14F-4D97-AF65-F5344CB8AC3E}">
+        <p14:creationId xmlns:p14="http://schemas.microsoft.com/office/powerpoint/2010/main" val="3630769872"/>
+      </p:ext>
+    </p:extLst>
+  </p:cSld>
+  <p:clrMapOvr>
+    <a:masterClrMapping/>
+  </p:clrMapOvr>
+</p:sld>
+</file>
+
+<file path=ppt/slides/slide26.xml><?xml version="1.0" encoding="utf-8"?>
+<p:sld xmlns:a="http://schemas.openxmlformats.org/drawingml/2006/main" xmlns:r="http://schemas.openxmlformats.org/officeDocument/2006/relationships" xmlns:p="http://schemas.openxmlformats.org/presentationml/2006/main">
+  <p:cSld>
+    <p:spTree>
+      <p:nvGrpSpPr>
+        <p:cNvPr id="1" name=""/>
+        <p:cNvGrpSpPr/>
+        <p:nvPr/>
+      </p:nvGrpSpPr>
+      <p:grpSpPr>
+        <a:xfrm>
+          <a:off x="0" y="0"/>
+          <a:ext cx="0" cy="0"/>
+          <a:chOff x="0" y="0"/>
+          <a:chExt cx="0" cy="0"/>
+        </a:xfrm>
+      </p:grpSpPr>
+      <p:sp>
+        <p:nvSpPr>
+          <p:cNvPr id="2" name="Título 1">
+            <a:extLst>
+              <a:ext uri="{FF2B5EF4-FFF2-40B4-BE49-F238E27FC236}">
+                <a16:creationId xmlns:a16="http://schemas.microsoft.com/office/drawing/2014/main" id="{699DBA93-33D6-351E-0481-1AFB90151CC0}"/>
+              </a:ext>
+            </a:extLst>
+          </p:cNvPr>
+          <p:cNvSpPr>
+            <a:spLocks noGrp="1"/>
+          </p:cNvSpPr>
+          <p:nvPr>
+            <p:ph type="title"/>
+          </p:nvPr>
+        </p:nvSpPr>
+        <p:spPr/>
+        <p:txBody>
+          <a:bodyPr/>
+          <a:lstStyle/>
+          <a:p>
+            <a:r>
+              <a:rPr lang="es-ES" dirty="0"/>
+              <a:t>Ejemplo de mensaje</a:t>
+            </a:r>
+          </a:p>
+        </p:txBody>
+      </p:sp>
+      <p:sp>
+        <p:nvSpPr>
+          <p:cNvPr id="3" name="Marcador de contenido 2">
+            <a:extLst>
+              <a:ext uri="{FF2B5EF4-FFF2-40B4-BE49-F238E27FC236}">
+                <a16:creationId xmlns:a16="http://schemas.microsoft.com/office/drawing/2014/main" id="{6DB4D1E2-59B6-68AF-2048-74B77C976BD3}"/>
+              </a:ext>
+            </a:extLst>
+          </p:cNvPr>
+          <p:cNvSpPr>
+            <a:spLocks noGrp="1"/>
+          </p:cNvSpPr>
+          <p:nvPr>
+            <p:ph idx="1"/>
+          </p:nvPr>
+        </p:nvSpPr>
+        <p:spPr>
+          <a:xfrm>
+            <a:off x="581192" y="2180497"/>
+            <a:ext cx="11029615" cy="596260"/>
+          </a:xfrm>
+        </p:spPr>
+        <p:txBody>
+          <a:bodyPr>
+            <a:normAutofit lnSpcReduction="10000"/>
+          </a:bodyPr>
+          <a:lstStyle/>
+          <a:p>
+            <a:r>
+              <a:rPr lang="es-ES" dirty="0"/>
+              <a:t>Del </a:t>
+            </a:r>
+            <a:r>
+              <a:rPr lang="es-ES" dirty="0" err="1"/>
+              <a:t>Replicator</a:t>
+            </a:r>
+            <a:r>
+              <a:rPr lang="es-ES" dirty="0"/>
+              <a:t> 2 saldrá el siguiente mensaje hacia la entrada del </a:t>
+            </a:r>
+            <a:r>
+              <a:rPr lang="es-ES" dirty="0" err="1"/>
+              <a:t>Slimmer</a:t>
+            </a:r>
+            <a:r>
+              <a:rPr lang="es-ES" dirty="0"/>
+              <a:t> 4 en el que nos quedaríamos solo con la información del número de teléfono del alumno:</a:t>
+            </a:r>
+          </a:p>
+        </p:txBody>
+      </p:sp>
+      <p:pic>
+        <p:nvPicPr>
+          <p:cNvPr id="6" name="Imagen 5" descr="Texto&#10;&#10;Descripción generada automáticamente">
+            <a:extLst>
+              <a:ext uri="{FF2B5EF4-FFF2-40B4-BE49-F238E27FC236}">
+                <a16:creationId xmlns:a16="http://schemas.microsoft.com/office/drawing/2014/main" id="{1A8DC71B-5A52-21B3-42B4-F47F3047CECF}"/>
+              </a:ext>
+            </a:extLst>
+          </p:cNvPr>
+          <p:cNvPicPr>
+            <a:picLocks noChangeAspect="1"/>
+          </p:cNvPicPr>
+          <p:nvPr/>
+        </p:nvPicPr>
+        <p:blipFill>
+          <a:blip r:embed="rId2"/>
+          <a:stretch>
+            <a:fillRect/>
+          </a:stretch>
+        </p:blipFill>
+        <p:spPr>
+          <a:xfrm>
+            <a:off x="215831" y="3072792"/>
+            <a:ext cx="5511516" cy="1356237"/>
+          </a:xfrm>
+          <a:prstGeom prst="rect">
+            <a:avLst/>
+          </a:prstGeom>
+        </p:spPr>
+      </p:pic>
+      <p:pic>
+        <p:nvPicPr>
+          <p:cNvPr id="11" name="Imagen 10" descr="Texto&#10;&#10;Descripción generada automáticamente">
+            <a:extLst>
+              <a:ext uri="{FF2B5EF4-FFF2-40B4-BE49-F238E27FC236}">
+                <a16:creationId xmlns:a16="http://schemas.microsoft.com/office/drawing/2014/main" id="{64CA8FDC-B7EC-1EA5-E5EC-38A2D0CB3731}"/>
+              </a:ext>
+            </a:extLst>
+          </p:cNvPr>
+          <p:cNvPicPr>
+            <a:picLocks noChangeAspect="1"/>
+          </p:cNvPicPr>
+          <p:nvPr/>
+        </p:nvPicPr>
+        <p:blipFill>
+          <a:blip r:embed="rId3"/>
+          <a:stretch>
+            <a:fillRect/>
+          </a:stretch>
+        </p:blipFill>
+        <p:spPr>
+          <a:xfrm>
+            <a:off x="6095999" y="3068781"/>
+            <a:ext cx="5511516" cy="1343798"/>
+          </a:xfrm>
+          <a:prstGeom prst="rect">
+            <a:avLst/>
+          </a:prstGeom>
+        </p:spPr>
+      </p:pic>
+    </p:spTree>
+    <p:extLst>
+      <p:ext uri="{BB962C8B-B14F-4D97-AF65-F5344CB8AC3E}">
+        <p14:creationId xmlns:p14="http://schemas.microsoft.com/office/powerpoint/2010/main" val="2974065774"/>
+      </p:ext>
+    </p:extLst>
+  </p:cSld>
+  <p:clrMapOvr>
+    <a:masterClrMapping/>
+  </p:clrMapOvr>
+</p:sld>
+</file>
+
+<file path=ppt/slides/slide27.xml><?xml version="1.0" encoding="utf-8"?>
+<p:sld xmlns:a="http://schemas.openxmlformats.org/drawingml/2006/main" xmlns:r="http://schemas.openxmlformats.org/officeDocument/2006/relationships" xmlns:p="http://schemas.openxmlformats.org/presentationml/2006/main">
+  <p:cSld>
+    <p:spTree>
+      <p:nvGrpSpPr>
+        <p:cNvPr id="1" name=""/>
+        <p:cNvGrpSpPr/>
+        <p:nvPr/>
+      </p:nvGrpSpPr>
+      <p:grpSpPr>
+        <a:xfrm>
+          <a:off x="0" y="0"/>
+          <a:ext cx="0" cy="0"/>
+          <a:chOff x="0" y="0"/>
+          <a:chExt cx="0" cy="0"/>
+        </a:xfrm>
+      </p:grpSpPr>
+      <p:sp>
+        <p:nvSpPr>
+          <p:cNvPr id="2" name="Título 1">
+            <a:extLst>
+              <a:ext uri="{FF2B5EF4-FFF2-40B4-BE49-F238E27FC236}">
+                <a16:creationId xmlns:a16="http://schemas.microsoft.com/office/drawing/2014/main" id="{8D692F28-0EB3-DCB5-3631-5C098A06243D}"/>
+              </a:ext>
+            </a:extLst>
+          </p:cNvPr>
+          <p:cNvSpPr>
+            <a:spLocks noGrp="1"/>
+          </p:cNvSpPr>
+          <p:nvPr>
+            <p:ph type="title"/>
+          </p:nvPr>
+        </p:nvSpPr>
+        <p:spPr/>
+        <p:txBody>
+          <a:bodyPr>
+            <a:normAutofit/>
+          </a:bodyPr>
+          <a:lstStyle/>
+          <a:p>
+            <a:r>
+              <a:rPr lang="es-ES" sz="3200" dirty="0" err="1"/>
+              <a:t>Replicator</a:t>
+            </a:r>
+            <a:r>
+              <a:rPr lang="es-ES" sz="3200" dirty="0"/>
+              <a:t> 2 </a:t>
+            </a:r>
+            <a:r>
+              <a:rPr lang="es-ES" sz="3200" dirty="0">
+                <a:sym typeface="Wingdings" panose="05000000000000000000" pitchFamily="2" charset="2"/>
+              </a:rPr>
+              <a:t> </a:t>
+            </a:r>
+            <a:r>
+              <a:rPr lang="es-ES" sz="3200" dirty="0" err="1">
+                <a:sym typeface="Wingdings" panose="05000000000000000000" pitchFamily="2" charset="2"/>
+              </a:rPr>
+              <a:t>slimmer</a:t>
+            </a:r>
+            <a:r>
+              <a:rPr lang="es-ES" sz="3200" dirty="0">
+                <a:sym typeface="Wingdings" panose="05000000000000000000" pitchFamily="2" charset="2"/>
+              </a:rPr>
+              <a:t> 5</a:t>
+            </a:r>
+            <a:endParaRPr lang="es-ES" sz="3200" dirty="0"/>
+          </a:p>
+        </p:txBody>
+      </p:sp>
+      <p:sp>
+        <p:nvSpPr>
+          <p:cNvPr id="3" name="Marcador de texto 2">
+            <a:extLst>
+              <a:ext uri="{FF2B5EF4-FFF2-40B4-BE49-F238E27FC236}">
+                <a16:creationId xmlns:a16="http://schemas.microsoft.com/office/drawing/2014/main" id="{5B493C32-E059-9D76-B9C6-68E6600AAD06}"/>
+              </a:ext>
+            </a:extLst>
+          </p:cNvPr>
+          <p:cNvSpPr>
+            <a:spLocks noGrp="1"/>
+          </p:cNvSpPr>
+          <p:nvPr>
+            <p:ph type="body" idx="1"/>
+          </p:nvPr>
+        </p:nvSpPr>
+        <p:spPr/>
+        <p:txBody>
+          <a:bodyPr/>
+          <a:lstStyle/>
+          <a:p>
+            <a:r>
+              <a:rPr lang="es-ES" dirty="0"/>
+              <a:t>Ejemplo de mensaje</a:t>
+            </a:r>
+          </a:p>
+        </p:txBody>
+      </p:sp>
+      <p:pic>
+        <p:nvPicPr>
+          <p:cNvPr id="5" name="Imagen 4" descr="Diagrama&#10;&#10;Descripción generada automáticamente">
+            <a:extLst>
+              <a:ext uri="{FF2B5EF4-FFF2-40B4-BE49-F238E27FC236}">
+                <a16:creationId xmlns:a16="http://schemas.microsoft.com/office/drawing/2014/main" id="{7B6B1947-3D25-08B3-349D-DC2C9801C491}"/>
+              </a:ext>
+            </a:extLst>
+          </p:cNvPr>
+          <p:cNvPicPr>
+            <a:picLocks noChangeAspect="1"/>
+          </p:cNvPicPr>
+          <p:nvPr/>
+        </p:nvPicPr>
+        <p:blipFill>
+          <a:blip r:embed="rId2"/>
+          <a:stretch>
+            <a:fillRect/>
+          </a:stretch>
+        </p:blipFill>
+        <p:spPr>
+          <a:xfrm>
+            <a:off x="3809309" y="665121"/>
+            <a:ext cx="3505891" cy="3392150"/>
+          </a:xfrm>
+          <a:prstGeom prst="rect">
+            <a:avLst/>
+          </a:prstGeom>
+        </p:spPr>
+      </p:pic>
+    </p:spTree>
+    <p:extLst>
+      <p:ext uri="{BB962C8B-B14F-4D97-AF65-F5344CB8AC3E}">
+        <p14:creationId xmlns:p14="http://schemas.microsoft.com/office/powerpoint/2010/main" val="2648238641"/>
+      </p:ext>
+    </p:extLst>
+  </p:cSld>
+  <p:clrMapOvr>
+    <a:masterClrMapping/>
+  </p:clrMapOvr>
+</p:sld>
+</file>
+
+<file path=ppt/slides/slide28.xml><?xml version="1.0" encoding="utf-8"?>
+<p:sld xmlns:a="http://schemas.openxmlformats.org/drawingml/2006/main" xmlns:r="http://schemas.openxmlformats.org/officeDocument/2006/relationships" xmlns:p="http://schemas.openxmlformats.org/presentationml/2006/main">
+  <p:cSld>
+    <p:spTree>
+      <p:nvGrpSpPr>
+        <p:cNvPr id="1" name=""/>
+        <p:cNvGrpSpPr/>
+        <p:nvPr/>
+      </p:nvGrpSpPr>
+      <p:grpSpPr>
+        <a:xfrm>
+          <a:off x="0" y="0"/>
+          <a:ext cx="0" cy="0"/>
+          <a:chOff x="0" y="0"/>
+          <a:chExt cx="0" cy="0"/>
+        </a:xfrm>
+      </p:grpSpPr>
+      <p:sp>
+        <p:nvSpPr>
+          <p:cNvPr id="2" name="Título 1">
+            <a:extLst>
+              <a:ext uri="{FF2B5EF4-FFF2-40B4-BE49-F238E27FC236}">
+                <a16:creationId xmlns:a16="http://schemas.microsoft.com/office/drawing/2014/main" id="{699DBA93-33D6-351E-0481-1AFB90151CC0}"/>
+              </a:ext>
+            </a:extLst>
+          </p:cNvPr>
+          <p:cNvSpPr>
+            <a:spLocks noGrp="1"/>
+          </p:cNvSpPr>
+          <p:nvPr>
+            <p:ph type="title"/>
+          </p:nvPr>
+        </p:nvSpPr>
+        <p:spPr/>
+        <p:txBody>
+          <a:bodyPr/>
+          <a:lstStyle/>
+          <a:p>
+            <a:r>
+              <a:rPr lang="es-ES" dirty="0"/>
+              <a:t>Ejemplo de mensaje</a:t>
+            </a:r>
+          </a:p>
+        </p:txBody>
+      </p:sp>
+      <p:sp>
+        <p:nvSpPr>
+          <p:cNvPr id="3" name="Marcador de contenido 2">
+            <a:extLst>
+              <a:ext uri="{FF2B5EF4-FFF2-40B4-BE49-F238E27FC236}">
+                <a16:creationId xmlns:a16="http://schemas.microsoft.com/office/drawing/2014/main" id="{6DB4D1E2-59B6-68AF-2048-74B77C976BD3}"/>
+              </a:ext>
+            </a:extLst>
+          </p:cNvPr>
+          <p:cNvSpPr>
+            <a:spLocks noGrp="1"/>
+          </p:cNvSpPr>
+          <p:nvPr>
+            <p:ph idx="1"/>
+          </p:nvPr>
+        </p:nvSpPr>
+        <p:spPr>
+          <a:xfrm>
+            <a:off x="581192" y="2180497"/>
+            <a:ext cx="11029615" cy="596260"/>
+          </a:xfrm>
+        </p:spPr>
+        <p:txBody>
+          <a:bodyPr>
+            <a:normAutofit lnSpcReduction="10000"/>
+          </a:bodyPr>
+          <a:lstStyle/>
+          <a:p>
+            <a:pPr algn="just"/>
+            <a:r>
+              <a:rPr lang="es-ES" dirty="0"/>
+              <a:t>Del </a:t>
+            </a:r>
+            <a:r>
+              <a:rPr lang="es-ES" dirty="0" err="1"/>
+              <a:t>Replicator</a:t>
+            </a:r>
+            <a:r>
+              <a:rPr lang="es-ES" dirty="0"/>
+              <a:t> 2 saldrá el siguiente mensaje hacia la entrada del </a:t>
+            </a:r>
+            <a:r>
+              <a:rPr lang="es-ES" dirty="0" err="1"/>
+              <a:t>Slimmer</a:t>
+            </a:r>
+            <a:r>
+              <a:rPr lang="es-ES" dirty="0"/>
+              <a:t> 5 en el que nos quedaríamos solo con la información del correo del alumno:</a:t>
+            </a:r>
+          </a:p>
+        </p:txBody>
+      </p:sp>
+      <p:pic>
+        <p:nvPicPr>
+          <p:cNvPr id="6" name="Imagen 5" descr="Texto&#10;&#10;Descripción generada automáticamente">
+            <a:extLst>
+              <a:ext uri="{FF2B5EF4-FFF2-40B4-BE49-F238E27FC236}">
+                <a16:creationId xmlns:a16="http://schemas.microsoft.com/office/drawing/2014/main" id="{1A8DC71B-5A52-21B3-42B4-F47F3047CECF}"/>
+              </a:ext>
+            </a:extLst>
+          </p:cNvPr>
+          <p:cNvPicPr>
+            <a:picLocks noChangeAspect="1"/>
+          </p:cNvPicPr>
+          <p:nvPr/>
+        </p:nvPicPr>
+        <p:blipFill>
+          <a:blip r:embed="rId2"/>
+          <a:stretch>
+            <a:fillRect/>
+          </a:stretch>
+        </p:blipFill>
+        <p:spPr>
+          <a:xfrm>
+            <a:off x="581192" y="3134439"/>
+            <a:ext cx="5045980" cy="1241681"/>
+          </a:xfrm>
+          <a:prstGeom prst="rect">
+            <a:avLst/>
+          </a:prstGeom>
+        </p:spPr>
+      </p:pic>
+      <p:pic>
+        <p:nvPicPr>
+          <p:cNvPr id="4" name="Imagen 3" descr="Texto&#10;&#10;Descripción generada automáticamente">
+            <a:extLst>
+              <a:ext uri="{FF2B5EF4-FFF2-40B4-BE49-F238E27FC236}">
+                <a16:creationId xmlns:a16="http://schemas.microsoft.com/office/drawing/2014/main" id="{192AC9F7-C131-8889-5681-EC6CB8666515}"/>
+              </a:ext>
+            </a:extLst>
+          </p:cNvPr>
+          <p:cNvPicPr>
+            <a:picLocks noChangeAspect="1"/>
+          </p:cNvPicPr>
+          <p:nvPr/>
+        </p:nvPicPr>
+        <p:blipFill>
+          <a:blip r:embed="rId3"/>
+          <a:stretch>
+            <a:fillRect/>
+          </a:stretch>
+        </p:blipFill>
+        <p:spPr>
+          <a:xfrm>
+            <a:off x="5862376" y="3140695"/>
+            <a:ext cx="6113793" cy="1222758"/>
+          </a:xfrm>
+          <a:prstGeom prst="rect">
+            <a:avLst/>
+          </a:prstGeom>
+        </p:spPr>
+      </p:pic>
+    </p:spTree>
+    <p:extLst>
+      <p:ext uri="{BB962C8B-B14F-4D97-AF65-F5344CB8AC3E}">
+        <p14:creationId xmlns:p14="http://schemas.microsoft.com/office/powerpoint/2010/main" val="2658461113"/>
+      </p:ext>
+    </p:extLst>
+  </p:cSld>
+  <p:clrMapOvr>
+    <a:masterClrMapping/>
+  </p:clrMapOvr>
+</p:sld>
+</file>
+
+<file path=ppt/slides/slide29.xml><?xml version="1.0" encoding="utf-8"?>
+<p:sld xmlns:a="http://schemas.openxmlformats.org/drawingml/2006/main" xmlns:r="http://schemas.openxmlformats.org/officeDocument/2006/relationships" xmlns:p="http://schemas.openxmlformats.org/presentationml/2006/main">
+  <p:cSld>
+    <p:spTree>
+      <p:nvGrpSpPr>
+        <p:cNvPr id="1" name=""/>
+        <p:cNvGrpSpPr/>
+        <p:nvPr/>
+      </p:nvGrpSpPr>
+      <p:grpSpPr>
+        <a:xfrm>
+          <a:off x="0" y="0"/>
+          <a:ext cx="0" cy="0"/>
+          <a:chOff x="0" y="0"/>
+          <a:chExt cx="0" cy="0"/>
+        </a:xfrm>
+      </p:grpSpPr>
+      <p:sp>
+        <p:nvSpPr>
+          <p:cNvPr id="2" name="Título 1">
+            <a:extLst>
+              <a:ext uri="{FF2B5EF4-FFF2-40B4-BE49-F238E27FC236}">
+                <a16:creationId xmlns:a16="http://schemas.microsoft.com/office/drawing/2014/main" id="{8D692F28-0EB3-DCB5-3631-5C098A06243D}"/>
+              </a:ext>
+            </a:extLst>
+          </p:cNvPr>
+          <p:cNvSpPr>
+            <a:spLocks noGrp="1"/>
+          </p:cNvSpPr>
+          <p:nvPr>
+            <p:ph type="title"/>
+          </p:nvPr>
+        </p:nvSpPr>
+        <p:spPr/>
+        <p:txBody>
+          <a:bodyPr>
+            <a:normAutofit/>
+          </a:bodyPr>
+          <a:lstStyle/>
+          <a:p>
+            <a:r>
+              <a:rPr lang="es-ES" sz="3200" dirty="0"/>
+              <a:t>REPLICATOR 3 </a:t>
+            </a:r>
+            <a:r>
+              <a:rPr lang="es-ES" sz="3200" dirty="0">
+                <a:sym typeface="Wingdings" panose="05000000000000000000" pitchFamily="2" charset="2"/>
+              </a:rPr>
+              <a:t> CORRELATOR 1</a:t>
+            </a:r>
+            <a:endParaRPr lang="es-ES" sz="3200" dirty="0"/>
+          </a:p>
+        </p:txBody>
+      </p:sp>
+      <p:sp>
+        <p:nvSpPr>
+          <p:cNvPr id="3" name="Marcador de texto 2">
+            <a:extLst>
+              <a:ext uri="{FF2B5EF4-FFF2-40B4-BE49-F238E27FC236}">
+                <a16:creationId xmlns:a16="http://schemas.microsoft.com/office/drawing/2014/main" id="{5B493C32-E059-9D76-B9C6-68E6600AAD06}"/>
+              </a:ext>
+            </a:extLst>
+          </p:cNvPr>
+          <p:cNvSpPr>
+            <a:spLocks noGrp="1"/>
+          </p:cNvSpPr>
+          <p:nvPr>
+            <p:ph type="body" idx="1"/>
+          </p:nvPr>
+        </p:nvSpPr>
+        <p:spPr/>
+        <p:txBody>
+          <a:bodyPr/>
+          <a:lstStyle/>
+          <a:p>
+            <a:r>
+              <a:rPr lang="es-ES" dirty="0"/>
+              <a:t>Ejemplo de mensaje</a:t>
+            </a:r>
+          </a:p>
+        </p:txBody>
+      </p:sp>
+      <p:pic>
+        <p:nvPicPr>
+          <p:cNvPr id="7" name="Imagen 6" descr="Diagrama&#10;&#10;Descripción generada automáticamente">
+            <a:extLst>
+              <a:ext uri="{FF2B5EF4-FFF2-40B4-BE49-F238E27FC236}">
+                <a16:creationId xmlns:a16="http://schemas.microsoft.com/office/drawing/2014/main" id="{5768E495-39CE-69F5-5832-CB57922B06FE}"/>
+              </a:ext>
+            </a:extLst>
+          </p:cNvPr>
+          <p:cNvPicPr>
+            <a:picLocks noChangeAspect="1"/>
+          </p:cNvPicPr>
+          <p:nvPr/>
+        </p:nvPicPr>
+        <p:blipFill>
+          <a:blip r:embed="rId2"/>
+          <a:stretch>
+            <a:fillRect/>
+          </a:stretch>
+        </p:blipFill>
+        <p:spPr>
+          <a:xfrm>
+            <a:off x="3450290" y="738769"/>
+            <a:ext cx="5291419" cy="3089789"/>
+          </a:xfrm>
+          <a:prstGeom prst="rect">
+            <a:avLst/>
+          </a:prstGeom>
+        </p:spPr>
+      </p:pic>
+    </p:spTree>
+    <p:extLst>
+      <p:ext uri="{BB962C8B-B14F-4D97-AF65-F5344CB8AC3E}">
+        <p14:creationId xmlns:p14="http://schemas.microsoft.com/office/powerpoint/2010/main" val="2625268191"/>
+      </p:ext>
+    </p:extLst>
+  </p:cSld>
+  <p:clrMapOvr>
+    <a:masterClrMapping/>
+  </p:clrMapOvr>
+</p:sld>
+</file>
+
 <file path=ppt/slides/slide3.xml><?xml version="1.0" encoding="utf-8"?>
 <p:sld xmlns:a="http://schemas.openxmlformats.org/drawingml/2006/main" xmlns:r="http://schemas.openxmlformats.org/officeDocument/2006/relationships" xmlns:p="http://schemas.openxmlformats.org/presentationml/2006/main">
   <p:cSld>
@@ -7464,6 +8230,1507 @@
     <p:extLst>
       <p:ext uri="{BB962C8B-B14F-4D97-AF65-F5344CB8AC3E}">
         <p14:creationId xmlns:p14="http://schemas.microsoft.com/office/powerpoint/2010/main" val="2171636912"/>
+      </p:ext>
+    </p:extLst>
+  </p:cSld>
+  <p:clrMapOvr>
+    <a:masterClrMapping/>
+  </p:clrMapOvr>
+</p:sld>
+</file>
+
+<file path=ppt/slides/slide30.xml><?xml version="1.0" encoding="utf-8"?>
+<p:sld xmlns:a="http://schemas.openxmlformats.org/drawingml/2006/main" xmlns:r="http://schemas.openxmlformats.org/officeDocument/2006/relationships" xmlns:p="http://schemas.openxmlformats.org/presentationml/2006/main">
+  <p:cSld>
+    <p:spTree>
+      <p:nvGrpSpPr>
+        <p:cNvPr id="1" name=""/>
+        <p:cNvGrpSpPr/>
+        <p:nvPr/>
+      </p:nvGrpSpPr>
+      <p:grpSpPr>
+        <a:xfrm>
+          <a:off x="0" y="0"/>
+          <a:ext cx="0" cy="0"/>
+          <a:chOff x="0" y="0"/>
+          <a:chExt cx="0" cy="0"/>
+        </a:xfrm>
+      </p:grpSpPr>
+      <p:sp>
+        <p:nvSpPr>
+          <p:cNvPr id="2" name="Título 1">
+            <a:extLst>
+              <a:ext uri="{FF2B5EF4-FFF2-40B4-BE49-F238E27FC236}">
+                <a16:creationId xmlns:a16="http://schemas.microsoft.com/office/drawing/2014/main" id="{699DBA93-33D6-351E-0481-1AFB90151CC0}"/>
+              </a:ext>
+            </a:extLst>
+          </p:cNvPr>
+          <p:cNvSpPr>
+            <a:spLocks noGrp="1"/>
+          </p:cNvSpPr>
+          <p:nvPr>
+            <p:ph type="title"/>
+          </p:nvPr>
+        </p:nvSpPr>
+        <p:spPr/>
+        <p:txBody>
+          <a:bodyPr/>
+          <a:lstStyle/>
+          <a:p>
+            <a:r>
+              <a:rPr lang="es-ES" dirty="0"/>
+              <a:t>Ejemplo de mensaje</a:t>
+            </a:r>
+          </a:p>
+        </p:txBody>
+      </p:sp>
+      <p:sp>
+        <p:nvSpPr>
+          <p:cNvPr id="3" name="Marcador de contenido 2">
+            <a:extLst>
+              <a:ext uri="{FF2B5EF4-FFF2-40B4-BE49-F238E27FC236}">
+                <a16:creationId xmlns:a16="http://schemas.microsoft.com/office/drawing/2014/main" id="{6DB4D1E2-59B6-68AF-2048-74B77C976BD3}"/>
+              </a:ext>
+            </a:extLst>
+          </p:cNvPr>
+          <p:cNvSpPr>
+            <a:spLocks noGrp="1"/>
+          </p:cNvSpPr>
+          <p:nvPr>
+            <p:ph idx="1"/>
+          </p:nvPr>
+        </p:nvSpPr>
+        <p:spPr>
+          <a:xfrm>
+            <a:off x="581192" y="2180497"/>
+            <a:ext cx="11029615" cy="596260"/>
+          </a:xfrm>
+        </p:spPr>
+        <p:txBody>
+          <a:bodyPr>
+            <a:normAutofit lnSpcReduction="10000"/>
+          </a:bodyPr>
+          <a:lstStyle/>
+          <a:p>
+            <a:pPr algn="just"/>
+            <a:r>
+              <a:rPr lang="es-ES" dirty="0"/>
+              <a:t>Del </a:t>
+            </a:r>
+            <a:r>
+              <a:rPr lang="es-ES" dirty="0" err="1"/>
+              <a:t>Replicator</a:t>
+            </a:r>
+            <a:r>
+              <a:rPr lang="es-ES" dirty="0"/>
+              <a:t> 3 saldrá el siguiente mensaje hacia la entrada del </a:t>
+            </a:r>
+            <a:r>
+              <a:rPr lang="es-ES" dirty="0" err="1"/>
+              <a:t>Correlator</a:t>
+            </a:r>
+            <a:r>
+              <a:rPr lang="es-ES" dirty="0"/>
+              <a:t> 1, en el que nos quedaríamos con las asignaturas del alumno</a:t>
+            </a:r>
+          </a:p>
+        </p:txBody>
+      </p:sp>
+      <p:pic>
+        <p:nvPicPr>
+          <p:cNvPr id="9" name="Imagen 8" descr="Texto&#10;&#10;Descripción generada automáticamente">
+            <a:extLst>
+              <a:ext uri="{FF2B5EF4-FFF2-40B4-BE49-F238E27FC236}">
+                <a16:creationId xmlns:a16="http://schemas.microsoft.com/office/drawing/2014/main" id="{B0B42BE2-6B9F-9210-7BE4-788B667FFADE}"/>
+              </a:ext>
+            </a:extLst>
+          </p:cNvPr>
+          <p:cNvPicPr>
+            <a:picLocks noChangeAspect="1"/>
+          </p:cNvPicPr>
+          <p:nvPr/>
+        </p:nvPicPr>
+        <p:blipFill>
+          <a:blip r:embed="rId2"/>
+          <a:stretch>
+            <a:fillRect/>
+          </a:stretch>
+        </p:blipFill>
+        <p:spPr>
+          <a:xfrm>
+            <a:off x="3305924" y="2627901"/>
+            <a:ext cx="5580151" cy="3784646"/>
+          </a:xfrm>
+          <a:prstGeom prst="rect">
+            <a:avLst/>
+          </a:prstGeom>
+        </p:spPr>
+      </p:pic>
+    </p:spTree>
+    <p:extLst>
+      <p:ext uri="{BB962C8B-B14F-4D97-AF65-F5344CB8AC3E}">
+        <p14:creationId xmlns:p14="http://schemas.microsoft.com/office/powerpoint/2010/main" val="2737731972"/>
+      </p:ext>
+    </p:extLst>
+  </p:cSld>
+  <p:clrMapOvr>
+    <a:masterClrMapping/>
+  </p:clrMapOvr>
+</p:sld>
+</file>
+
+<file path=ppt/slides/slide31.xml><?xml version="1.0" encoding="utf-8"?>
+<p:sld xmlns:a="http://schemas.openxmlformats.org/drawingml/2006/main" xmlns:r="http://schemas.openxmlformats.org/officeDocument/2006/relationships" xmlns:p="http://schemas.openxmlformats.org/presentationml/2006/main">
+  <p:cSld>
+    <p:spTree>
+      <p:nvGrpSpPr>
+        <p:cNvPr id="1" name=""/>
+        <p:cNvGrpSpPr/>
+        <p:nvPr/>
+      </p:nvGrpSpPr>
+      <p:grpSpPr>
+        <a:xfrm>
+          <a:off x="0" y="0"/>
+          <a:ext cx="0" cy="0"/>
+          <a:chOff x="0" y="0"/>
+          <a:chExt cx="0" cy="0"/>
+        </a:xfrm>
+      </p:grpSpPr>
+      <p:sp>
+        <p:nvSpPr>
+          <p:cNvPr id="2" name="Título 1">
+            <a:extLst>
+              <a:ext uri="{FF2B5EF4-FFF2-40B4-BE49-F238E27FC236}">
+                <a16:creationId xmlns:a16="http://schemas.microsoft.com/office/drawing/2014/main" id="{8D692F28-0EB3-DCB5-3631-5C098A06243D}"/>
+              </a:ext>
+            </a:extLst>
+          </p:cNvPr>
+          <p:cNvSpPr>
+            <a:spLocks noGrp="1"/>
+          </p:cNvSpPr>
+          <p:nvPr>
+            <p:ph type="title"/>
+          </p:nvPr>
+        </p:nvSpPr>
+        <p:spPr/>
+        <p:txBody>
+          <a:bodyPr>
+            <a:normAutofit/>
+          </a:bodyPr>
+          <a:lstStyle/>
+          <a:p>
+            <a:r>
+              <a:rPr lang="es-ES" sz="3200" dirty="0"/>
+              <a:t>REPLICATOR 3 </a:t>
+            </a:r>
+            <a:r>
+              <a:rPr lang="es-ES" sz="3200" dirty="0">
+                <a:sym typeface="Wingdings" panose="05000000000000000000" pitchFamily="2" charset="2"/>
+              </a:rPr>
+              <a:t> CORRELATOR 2</a:t>
+            </a:r>
+            <a:endParaRPr lang="es-ES" sz="3200" dirty="0"/>
+          </a:p>
+        </p:txBody>
+      </p:sp>
+      <p:sp>
+        <p:nvSpPr>
+          <p:cNvPr id="3" name="Marcador de texto 2">
+            <a:extLst>
+              <a:ext uri="{FF2B5EF4-FFF2-40B4-BE49-F238E27FC236}">
+                <a16:creationId xmlns:a16="http://schemas.microsoft.com/office/drawing/2014/main" id="{5B493C32-E059-9D76-B9C6-68E6600AAD06}"/>
+              </a:ext>
+            </a:extLst>
+          </p:cNvPr>
+          <p:cNvSpPr>
+            <a:spLocks noGrp="1"/>
+          </p:cNvSpPr>
+          <p:nvPr>
+            <p:ph type="body" idx="1"/>
+          </p:nvPr>
+        </p:nvSpPr>
+        <p:spPr/>
+        <p:txBody>
+          <a:bodyPr/>
+          <a:lstStyle/>
+          <a:p>
+            <a:r>
+              <a:rPr lang="es-ES" dirty="0"/>
+              <a:t>Ejemplo de mensaje</a:t>
+            </a:r>
+          </a:p>
+        </p:txBody>
+      </p:sp>
+      <p:pic>
+        <p:nvPicPr>
+          <p:cNvPr id="5" name="Imagen 4" descr="Diagrama&#10;&#10;Descripción generada automáticamente">
+            <a:extLst>
+              <a:ext uri="{FF2B5EF4-FFF2-40B4-BE49-F238E27FC236}">
+                <a16:creationId xmlns:a16="http://schemas.microsoft.com/office/drawing/2014/main" id="{D3DB297A-4469-43F7-A6A2-026F3451C0E4}"/>
+              </a:ext>
+            </a:extLst>
+          </p:cNvPr>
+          <p:cNvPicPr>
+            <a:picLocks noChangeAspect="1"/>
+          </p:cNvPicPr>
+          <p:nvPr/>
+        </p:nvPicPr>
+        <p:blipFill>
+          <a:blip r:embed="rId2"/>
+          <a:stretch>
+            <a:fillRect/>
+          </a:stretch>
+        </p:blipFill>
+        <p:spPr>
+          <a:xfrm>
+            <a:off x="3102695" y="883796"/>
+            <a:ext cx="5986609" cy="2545204"/>
+          </a:xfrm>
+          <a:prstGeom prst="rect">
+            <a:avLst/>
+          </a:prstGeom>
+        </p:spPr>
+      </p:pic>
+    </p:spTree>
+    <p:extLst>
+      <p:ext uri="{BB962C8B-B14F-4D97-AF65-F5344CB8AC3E}">
+        <p14:creationId xmlns:p14="http://schemas.microsoft.com/office/powerpoint/2010/main" val="178906056"/>
+      </p:ext>
+    </p:extLst>
+  </p:cSld>
+  <p:clrMapOvr>
+    <a:masterClrMapping/>
+  </p:clrMapOvr>
+</p:sld>
+</file>
+
+<file path=ppt/slides/slide32.xml><?xml version="1.0" encoding="utf-8"?>
+<p:sld xmlns:a="http://schemas.openxmlformats.org/drawingml/2006/main" xmlns:r="http://schemas.openxmlformats.org/officeDocument/2006/relationships" xmlns:p="http://schemas.openxmlformats.org/presentationml/2006/main">
+  <p:cSld>
+    <p:spTree>
+      <p:nvGrpSpPr>
+        <p:cNvPr id="1" name=""/>
+        <p:cNvGrpSpPr/>
+        <p:nvPr/>
+      </p:nvGrpSpPr>
+      <p:grpSpPr>
+        <a:xfrm>
+          <a:off x="0" y="0"/>
+          <a:ext cx="0" cy="0"/>
+          <a:chOff x="0" y="0"/>
+          <a:chExt cx="0" cy="0"/>
+        </a:xfrm>
+      </p:grpSpPr>
+      <p:sp>
+        <p:nvSpPr>
+          <p:cNvPr id="2" name="Título 1">
+            <a:extLst>
+              <a:ext uri="{FF2B5EF4-FFF2-40B4-BE49-F238E27FC236}">
+                <a16:creationId xmlns:a16="http://schemas.microsoft.com/office/drawing/2014/main" id="{699DBA93-33D6-351E-0481-1AFB90151CC0}"/>
+              </a:ext>
+            </a:extLst>
+          </p:cNvPr>
+          <p:cNvSpPr>
+            <a:spLocks noGrp="1"/>
+          </p:cNvSpPr>
+          <p:nvPr>
+            <p:ph type="title"/>
+          </p:nvPr>
+        </p:nvSpPr>
+        <p:spPr/>
+        <p:txBody>
+          <a:bodyPr/>
+          <a:lstStyle/>
+          <a:p>
+            <a:r>
+              <a:rPr lang="es-ES" dirty="0"/>
+              <a:t>Ejemplo de mensaje</a:t>
+            </a:r>
+          </a:p>
+        </p:txBody>
+      </p:sp>
+      <p:sp>
+        <p:nvSpPr>
+          <p:cNvPr id="3" name="Marcador de contenido 2">
+            <a:extLst>
+              <a:ext uri="{FF2B5EF4-FFF2-40B4-BE49-F238E27FC236}">
+                <a16:creationId xmlns:a16="http://schemas.microsoft.com/office/drawing/2014/main" id="{6DB4D1E2-59B6-68AF-2048-74B77C976BD3}"/>
+              </a:ext>
+            </a:extLst>
+          </p:cNvPr>
+          <p:cNvSpPr>
+            <a:spLocks noGrp="1"/>
+          </p:cNvSpPr>
+          <p:nvPr>
+            <p:ph idx="1"/>
+          </p:nvPr>
+        </p:nvSpPr>
+        <p:spPr>
+          <a:xfrm>
+            <a:off x="581192" y="2180497"/>
+            <a:ext cx="11029615" cy="596260"/>
+          </a:xfrm>
+        </p:spPr>
+        <p:txBody>
+          <a:bodyPr>
+            <a:normAutofit lnSpcReduction="10000"/>
+          </a:bodyPr>
+          <a:lstStyle/>
+          <a:p>
+            <a:pPr algn="just"/>
+            <a:r>
+              <a:rPr lang="es-ES" dirty="0"/>
+              <a:t>Del </a:t>
+            </a:r>
+            <a:r>
+              <a:rPr lang="es-ES" dirty="0" err="1"/>
+              <a:t>Replicator</a:t>
+            </a:r>
+            <a:r>
+              <a:rPr lang="es-ES" dirty="0"/>
+              <a:t> 3 saldrá el siguiente mensaje hacia la entrada del </a:t>
+            </a:r>
+            <a:r>
+              <a:rPr lang="es-ES" dirty="0" err="1"/>
+              <a:t>Correlator</a:t>
+            </a:r>
+            <a:r>
+              <a:rPr lang="es-ES" dirty="0"/>
+              <a:t> 2, en el que simplemente replicamos las asignaturas del alumno</a:t>
+            </a:r>
+          </a:p>
+        </p:txBody>
+      </p:sp>
+      <p:pic>
+        <p:nvPicPr>
+          <p:cNvPr id="9" name="Imagen 8" descr="Texto&#10;&#10;Descripción generada automáticamente">
+            <a:extLst>
+              <a:ext uri="{FF2B5EF4-FFF2-40B4-BE49-F238E27FC236}">
+                <a16:creationId xmlns:a16="http://schemas.microsoft.com/office/drawing/2014/main" id="{B0B42BE2-6B9F-9210-7BE4-788B667FFADE}"/>
+              </a:ext>
+            </a:extLst>
+          </p:cNvPr>
+          <p:cNvPicPr>
+            <a:picLocks noChangeAspect="1"/>
+          </p:cNvPicPr>
+          <p:nvPr/>
+        </p:nvPicPr>
+        <p:blipFill>
+          <a:blip r:embed="rId2"/>
+          <a:stretch>
+            <a:fillRect/>
+          </a:stretch>
+        </p:blipFill>
+        <p:spPr>
+          <a:xfrm>
+            <a:off x="3444147" y="2776757"/>
+            <a:ext cx="5303704" cy="3597150"/>
+          </a:xfrm>
+          <a:prstGeom prst="rect">
+            <a:avLst/>
+          </a:prstGeom>
+        </p:spPr>
+      </p:pic>
+    </p:spTree>
+    <p:extLst>
+      <p:ext uri="{BB962C8B-B14F-4D97-AF65-F5344CB8AC3E}">
+        <p14:creationId xmlns:p14="http://schemas.microsoft.com/office/powerpoint/2010/main" val="4063874732"/>
+      </p:ext>
+    </p:extLst>
+  </p:cSld>
+  <p:clrMapOvr>
+    <a:masterClrMapping/>
+  </p:clrMapOvr>
+</p:sld>
+</file>
+
+<file path=ppt/slides/slide33.xml><?xml version="1.0" encoding="utf-8"?>
+<p:sld xmlns:a="http://schemas.openxmlformats.org/drawingml/2006/main" xmlns:r="http://schemas.openxmlformats.org/officeDocument/2006/relationships" xmlns:p="http://schemas.openxmlformats.org/presentationml/2006/main">
+  <p:cSld>
+    <p:spTree>
+      <p:nvGrpSpPr>
+        <p:cNvPr id="1" name=""/>
+        <p:cNvGrpSpPr/>
+        <p:nvPr/>
+      </p:nvGrpSpPr>
+      <p:grpSpPr>
+        <a:xfrm>
+          <a:off x="0" y="0"/>
+          <a:ext cx="0" cy="0"/>
+          <a:chOff x="0" y="0"/>
+          <a:chExt cx="0" cy="0"/>
+        </a:xfrm>
+      </p:grpSpPr>
+      <p:sp>
+        <p:nvSpPr>
+          <p:cNvPr id="2" name="Título 1">
+            <a:extLst>
+              <a:ext uri="{FF2B5EF4-FFF2-40B4-BE49-F238E27FC236}">
+                <a16:creationId xmlns:a16="http://schemas.microsoft.com/office/drawing/2014/main" id="{8D692F28-0EB3-DCB5-3631-5C098A06243D}"/>
+              </a:ext>
+            </a:extLst>
+          </p:cNvPr>
+          <p:cNvSpPr>
+            <a:spLocks noGrp="1"/>
+          </p:cNvSpPr>
+          <p:nvPr>
+            <p:ph type="title"/>
+          </p:nvPr>
+        </p:nvSpPr>
+        <p:spPr/>
+        <p:txBody>
+          <a:bodyPr>
+            <a:normAutofit/>
+          </a:bodyPr>
+          <a:lstStyle/>
+          <a:p>
+            <a:r>
+              <a:rPr lang="es-ES" sz="3200" dirty="0"/>
+              <a:t>CORRELATOR 1 </a:t>
+            </a:r>
+            <a:r>
+              <a:rPr lang="es-ES" sz="3200" dirty="0">
+                <a:sym typeface="Wingdings" panose="05000000000000000000" pitchFamily="2" charset="2"/>
+              </a:rPr>
+              <a:t> CONTEXT ENRICHER 1</a:t>
+            </a:r>
+            <a:endParaRPr lang="es-ES" sz="3200" dirty="0"/>
+          </a:p>
+        </p:txBody>
+      </p:sp>
+      <p:sp>
+        <p:nvSpPr>
+          <p:cNvPr id="3" name="Marcador de texto 2">
+            <a:extLst>
+              <a:ext uri="{FF2B5EF4-FFF2-40B4-BE49-F238E27FC236}">
+                <a16:creationId xmlns:a16="http://schemas.microsoft.com/office/drawing/2014/main" id="{5B493C32-E059-9D76-B9C6-68E6600AAD06}"/>
+              </a:ext>
+            </a:extLst>
+          </p:cNvPr>
+          <p:cNvSpPr>
+            <a:spLocks noGrp="1"/>
+          </p:cNvSpPr>
+          <p:nvPr>
+            <p:ph type="body" idx="1"/>
+          </p:nvPr>
+        </p:nvSpPr>
+        <p:spPr/>
+        <p:txBody>
+          <a:bodyPr/>
+          <a:lstStyle/>
+          <a:p>
+            <a:r>
+              <a:rPr lang="es-ES" dirty="0"/>
+              <a:t>Ejemplo de mensaje</a:t>
+            </a:r>
+          </a:p>
+        </p:txBody>
+      </p:sp>
+      <p:pic>
+        <p:nvPicPr>
+          <p:cNvPr id="6" name="Imagen 5" descr="Diagrama, Esquemático&#10;&#10;Descripción generada automáticamente">
+            <a:extLst>
+              <a:ext uri="{FF2B5EF4-FFF2-40B4-BE49-F238E27FC236}">
+                <a16:creationId xmlns:a16="http://schemas.microsoft.com/office/drawing/2014/main" id="{4665CFB2-C471-4351-755A-CC7A640FB216}"/>
+              </a:ext>
+            </a:extLst>
+          </p:cNvPr>
+          <p:cNvPicPr>
+            <a:picLocks noChangeAspect="1"/>
+          </p:cNvPicPr>
+          <p:nvPr/>
+        </p:nvPicPr>
+        <p:blipFill>
+          <a:blip r:embed="rId2"/>
+          <a:stretch>
+            <a:fillRect/>
+          </a:stretch>
+        </p:blipFill>
+        <p:spPr>
+          <a:xfrm>
+            <a:off x="2940979" y="788340"/>
+            <a:ext cx="6581946" cy="2826729"/>
+          </a:xfrm>
+          <a:prstGeom prst="rect">
+            <a:avLst/>
+          </a:prstGeom>
+        </p:spPr>
+      </p:pic>
+    </p:spTree>
+    <p:extLst>
+      <p:ext uri="{BB962C8B-B14F-4D97-AF65-F5344CB8AC3E}">
+        <p14:creationId xmlns:p14="http://schemas.microsoft.com/office/powerpoint/2010/main" val="4152566982"/>
+      </p:ext>
+    </p:extLst>
+  </p:cSld>
+  <p:clrMapOvr>
+    <a:masterClrMapping/>
+  </p:clrMapOvr>
+</p:sld>
+</file>
+
+<file path=ppt/slides/slide34.xml><?xml version="1.0" encoding="utf-8"?>
+<p:sld xmlns:a="http://schemas.openxmlformats.org/drawingml/2006/main" xmlns:r="http://schemas.openxmlformats.org/officeDocument/2006/relationships" xmlns:p="http://schemas.openxmlformats.org/presentationml/2006/main">
+  <p:cSld>
+    <p:spTree>
+      <p:nvGrpSpPr>
+        <p:cNvPr id="1" name=""/>
+        <p:cNvGrpSpPr/>
+        <p:nvPr/>
+      </p:nvGrpSpPr>
+      <p:grpSpPr>
+        <a:xfrm>
+          <a:off x="0" y="0"/>
+          <a:ext cx="0" cy="0"/>
+          <a:chOff x="0" y="0"/>
+          <a:chExt cx="0" cy="0"/>
+        </a:xfrm>
+      </p:grpSpPr>
+      <p:sp>
+        <p:nvSpPr>
+          <p:cNvPr id="2" name="Título 1">
+            <a:extLst>
+              <a:ext uri="{FF2B5EF4-FFF2-40B4-BE49-F238E27FC236}">
+                <a16:creationId xmlns:a16="http://schemas.microsoft.com/office/drawing/2014/main" id="{699DBA93-33D6-351E-0481-1AFB90151CC0}"/>
+              </a:ext>
+            </a:extLst>
+          </p:cNvPr>
+          <p:cNvSpPr>
+            <a:spLocks noGrp="1"/>
+          </p:cNvSpPr>
+          <p:nvPr>
+            <p:ph type="title"/>
+          </p:nvPr>
+        </p:nvSpPr>
+        <p:spPr/>
+        <p:txBody>
+          <a:bodyPr/>
+          <a:lstStyle/>
+          <a:p>
+            <a:r>
+              <a:rPr lang="es-ES" dirty="0"/>
+              <a:t>Ejemplo de mensaje</a:t>
+            </a:r>
+          </a:p>
+        </p:txBody>
+      </p:sp>
+      <p:sp>
+        <p:nvSpPr>
+          <p:cNvPr id="3" name="Marcador de contenido 2">
+            <a:extLst>
+              <a:ext uri="{FF2B5EF4-FFF2-40B4-BE49-F238E27FC236}">
+                <a16:creationId xmlns:a16="http://schemas.microsoft.com/office/drawing/2014/main" id="{6DB4D1E2-59B6-68AF-2048-74B77C976BD3}"/>
+              </a:ext>
+            </a:extLst>
+          </p:cNvPr>
+          <p:cNvSpPr>
+            <a:spLocks noGrp="1"/>
+          </p:cNvSpPr>
+          <p:nvPr>
+            <p:ph idx="1"/>
+          </p:nvPr>
+        </p:nvSpPr>
+        <p:spPr>
+          <a:xfrm>
+            <a:off x="581192" y="2180497"/>
+            <a:ext cx="11029615" cy="596260"/>
+          </a:xfrm>
+        </p:spPr>
+        <p:txBody>
+          <a:bodyPr>
+            <a:normAutofit lnSpcReduction="10000"/>
+          </a:bodyPr>
+          <a:lstStyle/>
+          <a:p>
+            <a:pPr algn="just"/>
+            <a:r>
+              <a:rPr lang="es-ES" dirty="0"/>
+              <a:t>Del </a:t>
+            </a:r>
+            <a:r>
+              <a:rPr lang="es-ES" dirty="0" err="1"/>
+              <a:t>Correlator</a:t>
+            </a:r>
+            <a:r>
+              <a:rPr lang="es-ES" dirty="0"/>
+              <a:t> 1 saldrá el siguiente mensaje hacia la entrada del </a:t>
+            </a:r>
+            <a:r>
+              <a:rPr lang="es-ES" dirty="0" err="1"/>
+              <a:t>Context</a:t>
+            </a:r>
+            <a:r>
+              <a:rPr lang="es-ES" dirty="0"/>
+              <a:t> </a:t>
+            </a:r>
+            <a:r>
+              <a:rPr lang="es-ES" dirty="0" err="1"/>
+              <a:t>Enricher</a:t>
+            </a:r>
+            <a:r>
+              <a:rPr lang="es-ES" dirty="0"/>
+              <a:t> 1, en el que juntamos las asignaturas del alumno y su número de teléfono en un solo mensaje</a:t>
+            </a:r>
+          </a:p>
+        </p:txBody>
+      </p:sp>
+      <p:pic>
+        <p:nvPicPr>
+          <p:cNvPr id="5" name="Imagen 4" descr="Texto&#10;&#10;Descripción generada automáticamente">
+            <a:extLst>
+              <a:ext uri="{FF2B5EF4-FFF2-40B4-BE49-F238E27FC236}">
+                <a16:creationId xmlns:a16="http://schemas.microsoft.com/office/drawing/2014/main" id="{062B9499-71B8-0199-19FB-B5C5ABF95A54}"/>
+              </a:ext>
+            </a:extLst>
+          </p:cNvPr>
+          <p:cNvPicPr>
+            <a:picLocks noChangeAspect="1"/>
+          </p:cNvPicPr>
+          <p:nvPr/>
+        </p:nvPicPr>
+        <p:blipFill>
+          <a:blip r:embed="rId2"/>
+          <a:stretch>
+            <a:fillRect/>
+          </a:stretch>
+        </p:blipFill>
+        <p:spPr>
+          <a:xfrm>
+            <a:off x="6699181" y="2776757"/>
+            <a:ext cx="4769131" cy="3953764"/>
+          </a:xfrm>
+          <a:prstGeom prst="rect">
+            <a:avLst/>
+          </a:prstGeom>
+        </p:spPr>
+      </p:pic>
+      <p:pic>
+        <p:nvPicPr>
+          <p:cNvPr id="6" name="Imagen 5" descr="Texto&#10;&#10;Descripción generada automáticamente">
+            <a:extLst>
+              <a:ext uri="{FF2B5EF4-FFF2-40B4-BE49-F238E27FC236}">
+                <a16:creationId xmlns:a16="http://schemas.microsoft.com/office/drawing/2014/main" id="{B97AB29C-FB27-DE56-4F5C-FC546FF149EF}"/>
+              </a:ext>
+            </a:extLst>
+          </p:cNvPr>
+          <p:cNvPicPr>
+            <a:picLocks noChangeAspect="1"/>
+          </p:cNvPicPr>
+          <p:nvPr/>
+        </p:nvPicPr>
+        <p:blipFill>
+          <a:blip r:embed="rId3"/>
+          <a:stretch>
+            <a:fillRect/>
+          </a:stretch>
+        </p:blipFill>
+        <p:spPr>
+          <a:xfrm>
+            <a:off x="1123209" y="2776757"/>
+            <a:ext cx="3720777" cy="2523555"/>
+          </a:xfrm>
+          <a:prstGeom prst="rect">
+            <a:avLst/>
+          </a:prstGeom>
+        </p:spPr>
+      </p:pic>
+      <p:pic>
+        <p:nvPicPr>
+          <p:cNvPr id="8" name="Imagen 7" descr="Texto&#10;&#10;Descripción generada automáticamente con confianza media">
+            <a:extLst>
+              <a:ext uri="{FF2B5EF4-FFF2-40B4-BE49-F238E27FC236}">
+                <a16:creationId xmlns:a16="http://schemas.microsoft.com/office/drawing/2014/main" id="{9A887A11-9EAF-6C06-2FBB-E0A31C668E08}"/>
+              </a:ext>
+            </a:extLst>
+          </p:cNvPr>
+          <p:cNvPicPr>
+            <a:picLocks noChangeAspect="1"/>
+          </p:cNvPicPr>
+          <p:nvPr/>
+        </p:nvPicPr>
+        <p:blipFill>
+          <a:blip r:embed="rId4"/>
+          <a:stretch>
+            <a:fillRect/>
+          </a:stretch>
+        </p:blipFill>
+        <p:spPr>
+          <a:xfrm>
+            <a:off x="1123210" y="5343677"/>
+            <a:ext cx="4369610" cy="1154825"/>
+          </a:xfrm>
+          <a:prstGeom prst="rect">
+            <a:avLst/>
+          </a:prstGeom>
+        </p:spPr>
+      </p:pic>
+    </p:spTree>
+    <p:extLst>
+      <p:ext uri="{BB962C8B-B14F-4D97-AF65-F5344CB8AC3E}">
+        <p14:creationId xmlns:p14="http://schemas.microsoft.com/office/powerpoint/2010/main" val="1403935133"/>
+      </p:ext>
+    </p:extLst>
+  </p:cSld>
+  <p:clrMapOvr>
+    <a:masterClrMapping/>
+  </p:clrMapOvr>
+</p:sld>
+</file>
+
+<file path=ppt/slides/slide35.xml><?xml version="1.0" encoding="utf-8"?>
+<p:sld xmlns:a="http://schemas.openxmlformats.org/drawingml/2006/main" xmlns:r="http://schemas.openxmlformats.org/officeDocument/2006/relationships" xmlns:p="http://schemas.openxmlformats.org/presentationml/2006/main">
+  <p:cSld>
+    <p:spTree>
+      <p:nvGrpSpPr>
+        <p:cNvPr id="1" name=""/>
+        <p:cNvGrpSpPr/>
+        <p:nvPr/>
+      </p:nvGrpSpPr>
+      <p:grpSpPr>
+        <a:xfrm>
+          <a:off x="0" y="0"/>
+          <a:ext cx="0" cy="0"/>
+          <a:chOff x="0" y="0"/>
+          <a:chExt cx="0" cy="0"/>
+        </a:xfrm>
+      </p:grpSpPr>
+      <p:sp>
+        <p:nvSpPr>
+          <p:cNvPr id="2" name="Título 1">
+            <a:extLst>
+              <a:ext uri="{FF2B5EF4-FFF2-40B4-BE49-F238E27FC236}">
+                <a16:creationId xmlns:a16="http://schemas.microsoft.com/office/drawing/2014/main" id="{8D692F28-0EB3-DCB5-3631-5C098A06243D}"/>
+              </a:ext>
+            </a:extLst>
+          </p:cNvPr>
+          <p:cNvSpPr>
+            <a:spLocks noGrp="1"/>
+          </p:cNvSpPr>
+          <p:nvPr>
+            <p:ph type="title"/>
+          </p:nvPr>
+        </p:nvSpPr>
+        <p:spPr/>
+        <p:txBody>
+          <a:bodyPr>
+            <a:normAutofit/>
+          </a:bodyPr>
+          <a:lstStyle/>
+          <a:p>
+            <a:r>
+              <a:rPr lang="es-ES" sz="3200" dirty="0"/>
+              <a:t>CORRELATOR 2 </a:t>
+            </a:r>
+            <a:r>
+              <a:rPr lang="es-ES" sz="3200" dirty="0">
+                <a:sym typeface="Wingdings" panose="05000000000000000000" pitchFamily="2" charset="2"/>
+              </a:rPr>
+              <a:t> CONTEXT ENRICHER 2</a:t>
+            </a:r>
+            <a:endParaRPr lang="es-ES" sz="3200" dirty="0"/>
+          </a:p>
+        </p:txBody>
+      </p:sp>
+      <p:sp>
+        <p:nvSpPr>
+          <p:cNvPr id="3" name="Marcador de texto 2">
+            <a:extLst>
+              <a:ext uri="{FF2B5EF4-FFF2-40B4-BE49-F238E27FC236}">
+                <a16:creationId xmlns:a16="http://schemas.microsoft.com/office/drawing/2014/main" id="{5B493C32-E059-9D76-B9C6-68E6600AAD06}"/>
+              </a:ext>
+            </a:extLst>
+          </p:cNvPr>
+          <p:cNvSpPr>
+            <a:spLocks noGrp="1"/>
+          </p:cNvSpPr>
+          <p:nvPr>
+            <p:ph type="body" idx="1"/>
+          </p:nvPr>
+        </p:nvSpPr>
+        <p:spPr/>
+        <p:txBody>
+          <a:bodyPr/>
+          <a:lstStyle/>
+          <a:p>
+            <a:r>
+              <a:rPr lang="es-ES" dirty="0"/>
+              <a:t>Ejemplo de mensaje</a:t>
+            </a:r>
+          </a:p>
+        </p:txBody>
+      </p:sp>
+      <p:pic>
+        <p:nvPicPr>
+          <p:cNvPr id="5" name="Imagen 4" descr="Diagrama, Esquemático&#10;&#10;Descripción generada automáticamente">
+            <a:extLst>
+              <a:ext uri="{FF2B5EF4-FFF2-40B4-BE49-F238E27FC236}">
+                <a16:creationId xmlns:a16="http://schemas.microsoft.com/office/drawing/2014/main" id="{62279739-E3FF-7DA6-8301-8E5E4B5D28EF}"/>
+              </a:ext>
+            </a:extLst>
+          </p:cNvPr>
+          <p:cNvPicPr>
+            <a:picLocks noChangeAspect="1"/>
+          </p:cNvPicPr>
+          <p:nvPr/>
+        </p:nvPicPr>
+        <p:blipFill>
+          <a:blip r:embed="rId2"/>
+          <a:stretch>
+            <a:fillRect/>
+          </a:stretch>
+        </p:blipFill>
+        <p:spPr>
+          <a:xfrm>
+            <a:off x="3172121" y="806443"/>
+            <a:ext cx="5847758" cy="2896208"/>
+          </a:xfrm>
+          <a:prstGeom prst="rect">
+            <a:avLst/>
+          </a:prstGeom>
+        </p:spPr>
+      </p:pic>
+    </p:spTree>
+    <p:extLst>
+      <p:ext uri="{BB962C8B-B14F-4D97-AF65-F5344CB8AC3E}">
+        <p14:creationId xmlns:p14="http://schemas.microsoft.com/office/powerpoint/2010/main" val="747936271"/>
+      </p:ext>
+    </p:extLst>
+  </p:cSld>
+  <p:clrMapOvr>
+    <a:masterClrMapping/>
+  </p:clrMapOvr>
+</p:sld>
+</file>
+
+<file path=ppt/slides/slide36.xml><?xml version="1.0" encoding="utf-8"?>
+<p:sld xmlns:a="http://schemas.openxmlformats.org/drawingml/2006/main" xmlns:r="http://schemas.openxmlformats.org/officeDocument/2006/relationships" xmlns:p="http://schemas.openxmlformats.org/presentationml/2006/main">
+  <p:cSld>
+    <p:spTree>
+      <p:nvGrpSpPr>
+        <p:cNvPr id="1" name=""/>
+        <p:cNvGrpSpPr/>
+        <p:nvPr/>
+      </p:nvGrpSpPr>
+      <p:grpSpPr>
+        <a:xfrm>
+          <a:off x="0" y="0"/>
+          <a:ext cx="0" cy="0"/>
+          <a:chOff x="0" y="0"/>
+          <a:chExt cx="0" cy="0"/>
+        </a:xfrm>
+      </p:grpSpPr>
+      <p:sp>
+        <p:nvSpPr>
+          <p:cNvPr id="2" name="Título 1">
+            <a:extLst>
+              <a:ext uri="{FF2B5EF4-FFF2-40B4-BE49-F238E27FC236}">
+                <a16:creationId xmlns:a16="http://schemas.microsoft.com/office/drawing/2014/main" id="{699DBA93-33D6-351E-0481-1AFB90151CC0}"/>
+              </a:ext>
+            </a:extLst>
+          </p:cNvPr>
+          <p:cNvSpPr>
+            <a:spLocks noGrp="1"/>
+          </p:cNvSpPr>
+          <p:nvPr>
+            <p:ph type="title"/>
+          </p:nvPr>
+        </p:nvSpPr>
+        <p:spPr/>
+        <p:txBody>
+          <a:bodyPr/>
+          <a:lstStyle/>
+          <a:p>
+            <a:r>
+              <a:rPr lang="es-ES" dirty="0"/>
+              <a:t>Ejemplo de mensaje</a:t>
+            </a:r>
+          </a:p>
+        </p:txBody>
+      </p:sp>
+      <p:sp>
+        <p:nvSpPr>
+          <p:cNvPr id="3" name="Marcador de contenido 2">
+            <a:extLst>
+              <a:ext uri="{FF2B5EF4-FFF2-40B4-BE49-F238E27FC236}">
+                <a16:creationId xmlns:a16="http://schemas.microsoft.com/office/drawing/2014/main" id="{6DB4D1E2-59B6-68AF-2048-74B77C976BD3}"/>
+              </a:ext>
+            </a:extLst>
+          </p:cNvPr>
+          <p:cNvSpPr>
+            <a:spLocks noGrp="1"/>
+          </p:cNvSpPr>
+          <p:nvPr>
+            <p:ph idx="1"/>
+          </p:nvPr>
+        </p:nvSpPr>
+        <p:spPr>
+          <a:xfrm>
+            <a:off x="581192" y="2180497"/>
+            <a:ext cx="11029615" cy="596260"/>
+          </a:xfrm>
+        </p:spPr>
+        <p:txBody>
+          <a:bodyPr>
+            <a:normAutofit lnSpcReduction="10000"/>
+          </a:bodyPr>
+          <a:lstStyle/>
+          <a:p>
+            <a:pPr algn="just"/>
+            <a:r>
+              <a:rPr lang="es-ES" dirty="0"/>
+              <a:t>Del </a:t>
+            </a:r>
+            <a:r>
+              <a:rPr lang="es-ES" dirty="0" err="1"/>
+              <a:t>Correlator</a:t>
+            </a:r>
+            <a:r>
+              <a:rPr lang="es-ES" dirty="0"/>
+              <a:t> 2 saldrá el siguiente mensaje hacia la entrada del </a:t>
+            </a:r>
+            <a:r>
+              <a:rPr lang="es-ES" dirty="0" err="1"/>
+              <a:t>Context</a:t>
+            </a:r>
+            <a:r>
+              <a:rPr lang="es-ES" dirty="0"/>
+              <a:t> </a:t>
+            </a:r>
+            <a:r>
+              <a:rPr lang="es-ES" dirty="0" err="1"/>
+              <a:t>Enricher</a:t>
+            </a:r>
+            <a:r>
+              <a:rPr lang="es-ES" dirty="0"/>
+              <a:t> 2, en el que juntamos las asignaturas del alumno y su correo electrónico en un solo mensaje</a:t>
+            </a:r>
+          </a:p>
+        </p:txBody>
+      </p:sp>
+      <p:pic>
+        <p:nvPicPr>
+          <p:cNvPr id="6" name="Imagen 5" descr="Texto&#10;&#10;Descripción generada automáticamente">
+            <a:extLst>
+              <a:ext uri="{FF2B5EF4-FFF2-40B4-BE49-F238E27FC236}">
+                <a16:creationId xmlns:a16="http://schemas.microsoft.com/office/drawing/2014/main" id="{B97AB29C-FB27-DE56-4F5C-FC546FF149EF}"/>
+              </a:ext>
+            </a:extLst>
+          </p:cNvPr>
+          <p:cNvPicPr>
+            <a:picLocks noChangeAspect="1"/>
+          </p:cNvPicPr>
+          <p:nvPr/>
+        </p:nvPicPr>
+        <p:blipFill>
+          <a:blip r:embed="rId2"/>
+          <a:stretch>
+            <a:fillRect/>
+          </a:stretch>
+        </p:blipFill>
+        <p:spPr>
+          <a:xfrm>
+            <a:off x="1123209" y="2776757"/>
+            <a:ext cx="3720777" cy="2523555"/>
+          </a:xfrm>
+          <a:prstGeom prst="rect">
+            <a:avLst/>
+          </a:prstGeom>
+        </p:spPr>
+      </p:pic>
+      <p:pic>
+        <p:nvPicPr>
+          <p:cNvPr id="7" name="Imagen 6" descr="Texto&#10;&#10;Descripción generada automáticamente">
+            <a:extLst>
+              <a:ext uri="{FF2B5EF4-FFF2-40B4-BE49-F238E27FC236}">
+                <a16:creationId xmlns:a16="http://schemas.microsoft.com/office/drawing/2014/main" id="{B4985C98-5CE3-3883-43B5-F6EA761C5E10}"/>
+              </a:ext>
+            </a:extLst>
+          </p:cNvPr>
+          <p:cNvPicPr>
+            <a:picLocks noChangeAspect="1"/>
+          </p:cNvPicPr>
+          <p:nvPr/>
+        </p:nvPicPr>
+        <p:blipFill>
+          <a:blip r:embed="rId3"/>
+          <a:stretch>
+            <a:fillRect/>
+          </a:stretch>
+        </p:blipFill>
+        <p:spPr>
+          <a:xfrm>
+            <a:off x="1123209" y="5500741"/>
+            <a:ext cx="5240116" cy="963855"/>
+          </a:xfrm>
+          <a:prstGeom prst="rect">
+            <a:avLst/>
+          </a:prstGeom>
+        </p:spPr>
+      </p:pic>
+      <p:pic>
+        <p:nvPicPr>
+          <p:cNvPr id="10" name="Imagen 9" descr="Texto&#10;&#10;Descripción generada automáticamente">
+            <a:extLst>
+              <a:ext uri="{FF2B5EF4-FFF2-40B4-BE49-F238E27FC236}">
+                <a16:creationId xmlns:a16="http://schemas.microsoft.com/office/drawing/2014/main" id="{FAADA9B1-C4DB-D8B4-87DA-FC3C9556CED0}"/>
+              </a:ext>
+            </a:extLst>
+          </p:cNvPr>
+          <p:cNvPicPr>
+            <a:picLocks noChangeAspect="1"/>
+          </p:cNvPicPr>
+          <p:nvPr/>
+        </p:nvPicPr>
+        <p:blipFill>
+          <a:blip r:embed="rId4"/>
+          <a:stretch>
+            <a:fillRect/>
+          </a:stretch>
+        </p:blipFill>
+        <p:spPr>
+          <a:xfrm>
+            <a:off x="6412376" y="2776757"/>
+            <a:ext cx="5517354" cy="3687839"/>
+          </a:xfrm>
+          <a:prstGeom prst="rect">
+            <a:avLst/>
+          </a:prstGeom>
+        </p:spPr>
+      </p:pic>
+    </p:spTree>
+    <p:extLst>
+      <p:ext uri="{BB962C8B-B14F-4D97-AF65-F5344CB8AC3E}">
+        <p14:creationId xmlns:p14="http://schemas.microsoft.com/office/powerpoint/2010/main" val="2952860686"/>
+      </p:ext>
+    </p:extLst>
+  </p:cSld>
+  <p:clrMapOvr>
+    <a:masterClrMapping/>
+  </p:clrMapOvr>
+</p:sld>
+</file>
+
+<file path=ppt/slides/slide37.xml><?xml version="1.0" encoding="utf-8"?>
+<p:sld xmlns:a="http://schemas.openxmlformats.org/drawingml/2006/main" xmlns:r="http://schemas.openxmlformats.org/officeDocument/2006/relationships" xmlns:p="http://schemas.openxmlformats.org/presentationml/2006/main">
+  <p:cSld>
+    <p:spTree>
+      <p:nvGrpSpPr>
+        <p:cNvPr id="1" name=""/>
+        <p:cNvGrpSpPr/>
+        <p:nvPr/>
+      </p:nvGrpSpPr>
+      <p:grpSpPr>
+        <a:xfrm>
+          <a:off x="0" y="0"/>
+          <a:ext cx="0" cy="0"/>
+          <a:chOff x="0" y="0"/>
+          <a:chExt cx="0" cy="0"/>
+        </a:xfrm>
+      </p:grpSpPr>
+      <p:sp>
+        <p:nvSpPr>
+          <p:cNvPr id="2" name="Título 1">
+            <a:extLst>
+              <a:ext uri="{FF2B5EF4-FFF2-40B4-BE49-F238E27FC236}">
+                <a16:creationId xmlns:a16="http://schemas.microsoft.com/office/drawing/2014/main" id="{8D692F28-0EB3-DCB5-3631-5C098A06243D}"/>
+              </a:ext>
+            </a:extLst>
+          </p:cNvPr>
+          <p:cNvSpPr>
+            <a:spLocks noGrp="1"/>
+          </p:cNvSpPr>
+          <p:nvPr>
+            <p:ph type="title"/>
+          </p:nvPr>
+        </p:nvSpPr>
+        <p:spPr/>
+        <p:txBody>
+          <a:bodyPr>
+            <a:normAutofit/>
+          </a:bodyPr>
+          <a:lstStyle/>
+          <a:p>
+            <a:r>
+              <a:rPr lang="es-ES" sz="3200" dirty="0">
+                <a:sym typeface="Wingdings" panose="05000000000000000000" pitchFamily="2" charset="2"/>
+              </a:rPr>
+              <a:t>CONTEXT ENRICHER 1</a:t>
+            </a:r>
+            <a:r>
+              <a:rPr lang="es-ES" sz="3200" dirty="0"/>
+              <a:t> </a:t>
+            </a:r>
+            <a:r>
+              <a:rPr lang="es-ES" sz="3200" dirty="0">
+                <a:sym typeface="Wingdings" panose="05000000000000000000" pitchFamily="2" charset="2"/>
+              </a:rPr>
+              <a:t> </a:t>
+            </a:r>
+            <a:r>
+              <a:rPr lang="es-ES" sz="3200" dirty="0" err="1">
+                <a:sym typeface="Wingdings" panose="05000000000000000000" pitchFamily="2" charset="2"/>
+              </a:rPr>
+              <a:t>Filter</a:t>
+            </a:r>
+            <a:r>
+              <a:rPr lang="es-ES" sz="3200" dirty="0">
+                <a:sym typeface="Wingdings" panose="05000000000000000000" pitchFamily="2" charset="2"/>
+              </a:rPr>
+              <a:t> 1</a:t>
+            </a:r>
+            <a:endParaRPr lang="es-ES" sz="3200" dirty="0"/>
+          </a:p>
+        </p:txBody>
+      </p:sp>
+      <p:sp>
+        <p:nvSpPr>
+          <p:cNvPr id="3" name="Marcador de texto 2">
+            <a:extLst>
+              <a:ext uri="{FF2B5EF4-FFF2-40B4-BE49-F238E27FC236}">
+                <a16:creationId xmlns:a16="http://schemas.microsoft.com/office/drawing/2014/main" id="{5B493C32-E059-9D76-B9C6-68E6600AAD06}"/>
+              </a:ext>
+            </a:extLst>
+          </p:cNvPr>
+          <p:cNvSpPr>
+            <a:spLocks noGrp="1"/>
+          </p:cNvSpPr>
+          <p:nvPr>
+            <p:ph type="body" idx="1"/>
+          </p:nvPr>
+        </p:nvSpPr>
+        <p:spPr/>
+        <p:txBody>
+          <a:bodyPr/>
+          <a:lstStyle/>
+          <a:p>
+            <a:r>
+              <a:rPr lang="es-ES" dirty="0"/>
+              <a:t>Ejemplo de mensaje</a:t>
+            </a:r>
+          </a:p>
+        </p:txBody>
+      </p:sp>
+      <p:pic>
+        <p:nvPicPr>
+          <p:cNvPr id="6" name="Imagen 5" descr="Diagrama&#10;&#10;Descripción generada automáticamente">
+            <a:extLst>
+              <a:ext uri="{FF2B5EF4-FFF2-40B4-BE49-F238E27FC236}">
+                <a16:creationId xmlns:a16="http://schemas.microsoft.com/office/drawing/2014/main" id="{8F11CEC3-3AF8-3161-2266-CBA2A633D46B}"/>
+              </a:ext>
+            </a:extLst>
+          </p:cNvPr>
+          <p:cNvPicPr>
+            <a:picLocks noChangeAspect="1"/>
+          </p:cNvPicPr>
+          <p:nvPr/>
+        </p:nvPicPr>
+        <p:blipFill>
+          <a:blip r:embed="rId2"/>
+          <a:stretch>
+            <a:fillRect/>
+          </a:stretch>
+        </p:blipFill>
+        <p:spPr>
+          <a:xfrm>
+            <a:off x="2921293" y="679254"/>
+            <a:ext cx="6349414" cy="3032820"/>
+          </a:xfrm>
+          <a:prstGeom prst="rect">
+            <a:avLst/>
+          </a:prstGeom>
+        </p:spPr>
+      </p:pic>
+    </p:spTree>
+    <p:extLst>
+      <p:ext uri="{BB962C8B-B14F-4D97-AF65-F5344CB8AC3E}">
+        <p14:creationId xmlns:p14="http://schemas.microsoft.com/office/powerpoint/2010/main" val="429043197"/>
+      </p:ext>
+    </p:extLst>
+  </p:cSld>
+  <p:clrMapOvr>
+    <a:masterClrMapping/>
+  </p:clrMapOvr>
+</p:sld>
+</file>
+
+<file path=ppt/slides/slide38.xml><?xml version="1.0" encoding="utf-8"?>
+<p:sld xmlns:a="http://schemas.openxmlformats.org/drawingml/2006/main" xmlns:r="http://schemas.openxmlformats.org/officeDocument/2006/relationships" xmlns:p="http://schemas.openxmlformats.org/presentationml/2006/main">
+  <p:cSld>
+    <p:spTree>
+      <p:nvGrpSpPr>
+        <p:cNvPr id="1" name=""/>
+        <p:cNvGrpSpPr/>
+        <p:nvPr/>
+      </p:nvGrpSpPr>
+      <p:grpSpPr>
+        <a:xfrm>
+          <a:off x="0" y="0"/>
+          <a:ext cx="0" cy="0"/>
+          <a:chOff x="0" y="0"/>
+          <a:chExt cx="0" cy="0"/>
+        </a:xfrm>
+      </p:grpSpPr>
+      <p:sp>
+        <p:nvSpPr>
+          <p:cNvPr id="2" name="Título 1">
+            <a:extLst>
+              <a:ext uri="{FF2B5EF4-FFF2-40B4-BE49-F238E27FC236}">
+                <a16:creationId xmlns:a16="http://schemas.microsoft.com/office/drawing/2014/main" id="{699DBA93-33D6-351E-0481-1AFB90151CC0}"/>
+              </a:ext>
+            </a:extLst>
+          </p:cNvPr>
+          <p:cNvSpPr>
+            <a:spLocks noGrp="1"/>
+          </p:cNvSpPr>
+          <p:nvPr>
+            <p:ph type="title"/>
+          </p:nvPr>
+        </p:nvSpPr>
+        <p:spPr/>
+        <p:txBody>
+          <a:bodyPr/>
+          <a:lstStyle/>
+          <a:p>
+            <a:r>
+              <a:rPr lang="es-ES" dirty="0"/>
+              <a:t>Ejemplo de mensaje</a:t>
+            </a:r>
+          </a:p>
+        </p:txBody>
+      </p:sp>
+      <p:sp>
+        <p:nvSpPr>
+          <p:cNvPr id="3" name="Marcador de contenido 2">
+            <a:extLst>
+              <a:ext uri="{FF2B5EF4-FFF2-40B4-BE49-F238E27FC236}">
+                <a16:creationId xmlns:a16="http://schemas.microsoft.com/office/drawing/2014/main" id="{6DB4D1E2-59B6-68AF-2048-74B77C976BD3}"/>
+              </a:ext>
+            </a:extLst>
+          </p:cNvPr>
+          <p:cNvSpPr>
+            <a:spLocks noGrp="1"/>
+          </p:cNvSpPr>
+          <p:nvPr>
+            <p:ph idx="1"/>
+          </p:nvPr>
+        </p:nvSpPr>
+        <p:spPr>
+          <a:xfrm>
+            <a:off x="581192" y="2180497"/>
+            <a:ext cx="11029615" cy="596260"/>
+          </a:xfrm>
+        </p:spPr>
+        <p:txBody>
+          <a:bodyPr>
+            <a:normAutofit lnSpcReduction="10000"/>
+          </a:bodyPr>
+          <a:lstStyle/>
+          <a:p>
+            <a:pPr algn="just"/>
+            <a:r>
+              <a:rPr lang="es-ES" dirty="0"/>
+              <a:t>Del </a:t>
+            </a:r>
+            <a:r>
+              <a:rPr lang="es-ES" dirty="0" err="1"/>
+              <a:t>Context</a:t>
+            </a:r>
+            <a:r>
+              <a:rPr lang="es-ES" dirty="0"/>
+              <a:t> </a:t>
+            </a:r>
+            <a:r>
+              <a:rPr lang="es-ES" dirty="0" err="1"/>
+              <a:t>Enricher</a:t>
+            </a:r>
+            <a:r>
+              <a:rPr lang="es-ES" dirty="0"/>
+              <a:t> 1 saldrá el siguiente mensaje hacia la entrada del </a:t>
+            </a:r>
+            <a:r>
+              <a:rPr lang="es-ES" dirty="0" err="1"/>
+              <a:t>Filter</a:t>
+            </a:r>
+            <a:r>
+              <a:rPr lang="es-ES" dirty="0"/>
+              <a:t> 1, en el que filtraremos si el alumno tiene teléfono o no. </a:t>
+            </a:r>
+          </a:p>
+        </p:txBody>
+      </p:sp>
+      <p:pic>
+        <p:nvPicPr>
+          <p:cNvPr id="4" name="Imagen 3" descr="Texto&#10;&#10;Descripción generada automáticamente">
+            <a:extLst>
+              <a:ext uri="{FF2B5EF4-FFF2-40B4-BE49-F238E27FC236}">
+                <a16:creationId xmlns:a16="http://schemas.microsoft.com/office/drawing/2014/main" id="{80D9136C-DB44-DDE1-224A-4FEE5B2EEF6F}"/>
+              </a:ext>
+            </a:extLst>
+          </p:cNvPr>
+          <p:cNvPicPr>
+            <a:picLocks noChangeAspect="1"/>
+          </p:cNvPicPr>
+          <p:nvPr/>
+        </p:nvPicPr>
+        <p:blipFill>
+          <a:blip r:embed="rId2"/>
+          <a:stretch>
+            <a:fillRect/>
+          </a:stretch>
+        </p:blipFill>
+        <p:spPr>
+          <a:xfrm>
+            <a:off x="3711433" y="2776757"/>
+            <a:ext cx="4769131" cy="3953764"/>
+          </a:xfrm>
+          <a:prstGeom prst="rect">
+            <a:avLst/>
+          </a:prstGeom>
+        </p:spPr>
+      </p:pic>
+    </p:spTree>
+    <p:extLst>
+      <p:ext uri="{BB962C8B-B14F-4D97-AF65-F5344CB8AC3E}">
+        <p14:creationId xmlns:p14="http://schemas.microsoft.com/office/powerpoint/2010/main" val="3038768747"/>
+      </p:ext>
+    </p:extLst>
+  </p:cSld>
+  <p:clrMapOvr>
+    <a:masterClrMapping/>
+  </p:clrMapOvr>
+</p:sld>
+</file>
+
+<file path=ppt/slides/slide39.xml><?xml version="1.0" encoding="utf-8"?>
+<p:sld xmlns:a="http://schemas.openxmlformats.org/drawingml/2006/main" xmlns:r="http://schemas.openxmlformats.org/officeDocument/2006/relationships" xmlns:p="http://schemas.openxmlformats.org/presentationml/2006/main">
+  <p:cSld>
+    <p:spTree>
+      <p:nvGrpSpPr>
+        <p:cNvPr id="1" name=""/>
+        <p:cNvGrpSpPr/>
+        <p:nvPr/>
+      </p:nvGrpSpPr>
+      <p:grpSpPr>
+        <a:xfrm>
+          <a:off x="0" y="0"/>
+          <a:ext cx="0" cy="0"/>
+          <a:chOff x="0" y="0"/>
+          <a:chExt cx="0" cy="0"/>
+        </a:xfrm>
+      </p:grpSpPr>
+      <p:sp>
+        <p:nvSpPr>
+          <p:cNvPr id="2" name="Título 1">
+            <a:extLst>
+              <a:ext uri="{FF2B5EF4-FFF2-40B4-BE49-F238E27FC236}">
+                <a16:creationId xmlns:a16="http://schemas.microsoft.com/office/drawing/2014/main" id="{8D692F28-0EB3-DCB5-3631-5C098A06243D}"/>
+              </a:ext>
+            </a:extLst>
+          </p:cNvPr>
+          <p:cNvSpPr>
+            <a:spLocks noGrp="1"/>
+          </p:cNvSpPr>
+          <p:nvPr>
+            <p:ph type="title"/>
+          </p:nvPr>
+        </p:nvSpPr>
+        <p:spPr/>
+        <p:txBody>
+          <a:bodyPr>
+            <a:normAutofit/>
+          </a:bodyPr>
+          <a:lstStyle/>
+          <a:p>
+            <a:r>
+              <a:rPr lang="es-ES" sz="3200" dirty="0" err="1">
+                <a:sym typeface="Wingdings" panose="05000000000000000000" pitchFamily="2" charset="2"/>
+              </a:rPr>
+              <a:t>Filter</a:t>
+            </a:r>
+            <a:r>
+              <a:rPr lang="es-ES" sz="3200" dirty="0">
+                <a:sym typeface="Wingdings" panose="05000000000000000000" pitchFamily="2" charset="2"/>
+              </a:rPr>
+              <a:t> 1  </a:t>
+            </a:r>
+            <a:r>
+              <a:rPr lang="es-ES" sz="3200" dirty="0" err="1">
+                <a:sym typeface="Wingdings" panose="05000000000000000000" pitchFamily="2" charset="2"/>
+              </a:rPr>
+              <a:t>Translator</a:t>
+            </a:r>
+            <a:r>
+              <a:rPr lang="es-ES" sz="3200" dirty="0">
+                <a:sym typeface="Wingdings" panose="05000000000000000000" pitchFamily="2" charset="2"/>
+              </a:rPr>
+              <a:t> 3</a:t>
+            </a:r>
+            <a:endParaRPr lang="es-ES" sz="3200" dirty="0"/>
+          </a:p>
+        </p:txBody>
+      </p:sp>
+      <p:sp>
+        <p:nvSpPr>
+          <p:cNvPr id="3" name="Marcador de texto 2">
+            <a:extLst>
+              <a:ext uri="{FF2B5EF4-FFF2-40B4-BE49-F238E27FC236}">
+                <a16:creationId xmlns:a16="http://schemas.microsoft.com/office/drawing/2014/main" id="{5B493C32-E059-9D76-B9C6-68E6600AAD06}"/>
+              </a:ext>
+            </a:extLst>
+          </p:cNvPr>
+          <p:cNvSpPr>
+            <a:spLocks noGrp="1"/>
+          </p:cNvSpPr>
+          <p:nvPr>
+            <p:ph type="body" idx="1"/>
+          </p:nvPr>
+        </p:nvSpPr>
+        <p:spPr/>
+        <p:txBody>
+          <a:bodyPr/>
+          <a:lstStyle/>
+          <a:p>
+            <a:r>
+              <a:rPr lang="es-ES" dirty="0"/>
+              <a:t>Ejemplo de mensaje</a:t>
+            </a:r>
+          </a:p>
+        </p:txBody>
+      </p:sp>
+      <p:pic>
+        <p:nvPicPr>
+          <p:cNvPr id="5" name="Imagen 4" descr="Diagrama&#10;&#10;Descripción generada automáticamente">
+            <a:extLst>
+              <a:ext uri="{FF2B5EF4-FFF2-40B4-BE49-F238E27FC236}">
+                <a16:creationId xmlns:a16="http://schemas.microsoft.com/office/drawing/2014/main" id="{9415062D-A549-DB05-C8FE-14840801FEDA}"/>
+              </a:ext>
+            </a:extLst>
+          </p:cNvPr>
+          <p:cNvPicPr>
+            <a:picLocks noChangeAspect="1"/>
+          </p:cNvPicPr>
+          <p:nvPr/>
+        </p:nvPicPr>
+        <p:blipFill>
+          <a:blip r:embed="rId2"/>
+          <a:stretch>
+            <a:fillRect/>
+          </a:stretch>
+        </p:blipFill>
+        <p:spPr>
+          <a:xfrm>
+            <a:off x="4998934" y="612858"/>
+            <a:ext cx="2092435" cy="3491309"/>
+          </a:xfrm>
+          <a:prstGeom prst="rect">
+            <a:avLst/>
+          </a:prstGeom>
+        </p:spPr>
+      </p:pic>
+    </p:spTree>
+    <p:extLst>
+      <p:ext uri="{BB962C8B-B14F-4D97-AF65-F5344CB8AC3E}">
+        <p14:creationId xmlns:p14="http://schemas.microsoft.com/office/powerpoint/2010/main" val="1906865571"/>
       </p:ext>
     </p:extLst>
   </p:cSld>
@@ -7669,6 +9936,933 @@
     <p:extLst>
       <p:ext uri="{BB962C8B-B14F-4D97-AF65-F5344CB8AC3E}">
         <p14:creationId xmlns:p14="http://schemas.microsoft.com/office/powerpoint/2010/main" val="1339968158"/>
+      </p:ext>
+    </p:extLst>
+  </p:cSld>
+  <p:clrMapOvr>
+    <a:masterClrMapping/>
+  </p:clrMapOvr>
+</p:sld>
+</file>
+
+<file path=ppt/slides/slide40.xml><?xml version="1.0" encoding="utf-8"?>
+<p:sld xmlns:a="http://schemas.openxmlformats.org/drawingml/2006/main" xmlns:r="http://schemas.openxmlformats.org/officeDocument/2006/relationships" xmlns:p="http://schemas.openxmlformats.org/presentationml/2006/main">
+  <p:cSld>
+    <p:spTree>
+      <p:nvGrpSpPr>
+        <p:cNvPr id="1" name=""/>
+        <p:cNvGrpSpPr/>
+        <p:nvPr/>
+      </p:nvGrpSpPr>
+      <p:grpSpPr>
+        <a:xfrm>
+          <a:off x="0" y="0"/>
+          <a:ext cx="0" cy="0"/>
+          <a:chOff x="0" y="0"/>
+          <a:chExt cx="0" cy="0"/>
+        </a:xfrm>
+      </p:grpSpPr>
+      <p:sp>
+        <p:nvSpPr>
+          <p:cNvPr id="2" name="Título 1">
+            <a:extLst>
+              <a:ext uri="{FF2B5EF4-FFF2-40B4-BE49-F238E27FC236}">
+                <a16:creationId xmlns:a16="http://schemas.microsoft.com/office/drawing/2014/main" id="{699DBA93-33D6-351E-0481-1AFB90151CC0}"/>
+              </a:ext>
+            </a:extLst>
+          </p:cNvPr>
+          <p:cNvSpPr>
+            <a:spLocks noGrp="1"/>
+          </p:cNvSpPr>
+          <p:nvPr>
+            <p:ph type="title"/>
+          </p:nvPr>
+        </p:nvSpPr>
+        <p:spPr/>
+        <p:txBody>
+          <a:bodyPr/>
+          <a:lstStyle/>
+          <a:p>
+            <a:r>
+              <a:rPr lang="es-ES" dirty="0"/>
+              <a:t>Ejemplo de mensaje</a:t>
+            </a:r>
+          </a:p>
+        </p:txBody>
+      </p:sp>
+      <p:sp>
+        <p:nvSpPr>
+          <p:cNvPr id="3" name="Marcador de contenido 2">
+            <a:extLst>
+              <a:ext uri="{FF2B5EF4-FFF2-40B4-BE49-F238E27FC236}">
+                <a16:creationId xmlns:a16="http://schemas.microsoft.com/office/drawing/2014/main" id="{6DB4D1E2-59B6-68AF-2048-74B77C976BD3}"/>
+              </a:ext>
+            </a:extLst>
+          </p:cNvPr>
+          <p:cNvSpPr>
+            <a:spLocks noGrp="1"/>
+          </p:cNvSpPr>
+          <p:nvPr>
+            <p:ph idx="1"/>
+          </p:nvPr>
+        </p:nvSpPr>
+        <p:spPr>
+          <a:xfrm>
+            <a:off x="581192" y="2180497"/>
+            <a:ext cx="11029615" cy="596260"/>
+          </a:xfrm>
+        </p:spPr>
+        <p:txBody>
+          <a:bodyPr>
+            <a:normAutofit lnSpcReduction="10000"/>
+          </a:bodyPr>
+          <a:lstStyle/>
+          <a:p>
+            <a:pPr algn="just"/>
+            <a:r>
+              <a:rPr lang="es-ES" dirty="0"/>
+              <a:t>Del </a:t>
+            </a:r>
+            <a:r>
+              <a:rPr lang="es-ES" dirty="0" err="1"/>
+              <a:t>Filter</a:t>
+            </a:r>
+            <a:r>
+              <a:rPr lang="es-ES" dirty="0"/>
+              <a:t> 1 saldrá el siguiente mensaje hacia la entrada del </a:t>
+            </a:r>
+            <a:r>
+              <a:rPr lang="es-ES" dirty="0" err="1"/>
+              <a:t>Translator</a:t>
+            </a:r>
+            <a:r>
+              <a:rPr lang="es-ES" dirty="0"/>
+              <a:t> 3, en el que traduciremos el mensaje a un formato que sea capaz de interpretar el sistema SMS Gateway</a:t>
+            </a:r>
+          </a:p>
+        </p:txBody>
+      </p:sp>
+      <p:pic>
+        <p:nvPicPr>
+          <p:cNvPr id="4" name="Imagen 3" descr="Texto&#10;&#10;Descripción generada automáticamente">
+            <a:extLst>
+              <a:ext uri="{FF2B5EF4-FFF2-40B4-BE49-F238E27FC236}">
+                <a16:creationId xmlns:a16="http://schemas.microsoft.com/office/drawing/2014/main" id="{80D9136C-DB44-DDE1-224A-4FEE5B2EEF6F}"/>
+              </a:ext>
+            </a:extLst>
+          </p:cNvPr>
+          <p:cNvPicPr>
+            <a:picLocks noChangeAspect="1"/>
+          </p:cNvPicPr>
+          <p:nvPr/>
+        </p:nvPicPr>
+        <p:blipFill>
+          <a:blip r:embed="rId2"/>
+          <a:stretch>
+            <a:fillRect/>
+          </a:stretch>
+        </p:blipFill>
+        <p:spPr>
+          <a:xfrm>
+            <a:off x="3711433" y="2776757"/>
+            <a:ext cx="4769131" cy="3953764"/>
+          </a:xfrm>
+          <a:prstGeom prst="rect">
+            <a:avLst/>
+          </a:prstGeom>
+        </p:spPr>
+      </p:pic>
+    </p:spTree>
+    <p:extLst>
+      <p:ext uri="{BB962C8B-B14F-4D97-AF65-F5344CB8AC3E}">
+        <p14:creationId xmlns:p14="http://schemas.microsoft.com/office/powerpoint/2010/main" val="1762352346"/>
+      </p:ext>
+    </p:extLst>
+  </p:cSld>
+  <p:clrMapOvr>
+    <a:masterClrMapping/>
+  </p:clrMapOvr>
+</p:sld>
+</file>
+
+<file path=ppt/slides/slide41.xml><?xml version="1.0" encoding="utf-8"?>
+<p:sld xmlns:a="http://schemas.openxmlformats.org/drawingml/2006/main" xmlns:r="http://schemas.openxmlformats.org/officeDocument/2006/relationships" xmlns:p="http://schemas.openxmlformats.org/presentationml/2006/main">
+  <p:cSld>
+    <p:spTree>
+      <p:nvGrpSpPr>
+        <p:cNvPr id="1" name=""/>
+        <p:cNvGrpSpPr/>
+        <p:nvPr/>
+      </p:nvGrpSpPr>
+      <p:grpSpPr>
+        <a:xfrm>
+          <a:off x="0" y="0"/>
+          <a:ext cx="0" cy="0"/>
+          <a:chOff x="0" y="0"/>
+          <a:chExt cx="0" cy="0"/>
+        </a:xfrm>
+      </p:grpSpPr>
+      <p:sp>
+        <p:nvSpPr>
+          <p:cNvPr id="2" name="Título 1">
+            <a:extLst>
+              <a:ext uri="{FF2B5EF4-FFF2-40B4-BE49-F238E27FC236}">
+                <a16:creationId xmlns:a16="http://schemas.microsoft.com/office/drawing/2014/main" id="{8D692F28-0EB3-DCB5-3631-5C098A06243D}"/>
+              </a:ext>
+            </a:extLst>
+          </p:cNvPr>
+          <p:cNvSpPr>
+            <a:spLocks noGrp="1"/>
+          </p:cNvSpPr>
+          <p:nvPr>
+            <p:ph type="title"/>
+          </p:nvPr>
+        </p:nvSpPr>
+        <p:spPr/>
+        <p:txBody>
+          <a:bodyPr>
+            <a:normAutofit/>
+          </a:bodyPr>
+          <a:lstStyle/>
+          <a:p>
+            <a:r>
+              <a:rPr lang="es-ES" sz="3200" dirty="0" err="1">
+                <a:sym typeface="Wingdings" panose="05000000000000000000" pitchFamily="2" charset="2"/>
+              </a:rPr>
+              <a:t>Translator</a:t>
+            </a:r>
+            <a:r>
+              <a:rPr lang="es-ES" sz="3200" dirty="0">
+                <a:sym typeface="Wingdings" panose="05000000000000000000" pitchFamily="2" charset="2"/>
+              </a:rPr>
+              <a:t> 3 SMS GATEWAY</a:t>
+            </a:r>
+            <a:endParaRPr lang="es-ES" sz="3200" dirty="0"/>
+          </a:p>
+        </p:txBody>
+      </p:sp>
+      <p:sp>
+        <p:nvSpPr>
+          <p:cNvPr id="3" name="Marcador de texto 2">
+            <a:extLst>
+              <a:ext uri="{FF2B5EF4-FFF2-40B4-BE49-F238E27FC236}">
+                <a16:creationId xmlns:a16="http://schemas.microsoft.com/office/drawing/2014/main" id="{5B493C32-E059-9D76-B9C6-68E6600AAD06}"/>
+              </a:ext>
+            </a:extLst>
+          </p:cNvPr>
+          <p:cNvSpPr>
+            <a:spLocks noGrp="1"/>
+          </p:cNvSpPr>
+          <p:nvPr>
+            <p:ph type="body" idx="1"/>
+          </p:nvPr>
+        </p:nvSpPr>
+        <p:spPr/>
+        <p:txBody>
+          <a:bodyPr/>
+          <a:lstStyle/>
+          <a:p>
+            <a:r>
+              <a:rPr lang="es-ES" dirty="0"/>
+              <a:t>Ejemplo de mensaje</a:t>
+            </a:r>
+          </a:p>
+        </p:txBody>
+      </p:sp>
+      <p:pic>
+        <p:nvPicPr>
+          <p:cNvPr id="6" name="Imagen 5" descr="Diagrama&#10;&#10;Descripción generada automáticamente">
+            <a:extLst>
+              <a:ext uri="{FF2B5EF4-FFF2-40B4-BE49-F238E27FC236}">
+                <a16:creationId xmlns:a16="http://schemas.microsoft.com/office/drawing/2014/main" id="{9C9808A5-2645-1253-ECB9-F1E6FD43D01A}"/>
+              </a:ext>
+            </a:extLst>
+          </p:cNvPr>
+          <p:cNvPicPr>
+            <a:picLocks noChangeAspect="1"/>
+          </p:cNvPicPr>
+          <p:nvPr/>
+        </p:nvPicPr>
+        <p:blipFill>
+          <a:blip r:embed="rId2"/>
+          <a:stretch>
+            <a:fillRect/>
+          </a:stretch>
+        </p:blipFill>
+        <p:spPr>
+          <a:xfrm>
+            <a:off x="5352945" y="602479"/>
+            <a:ext cx="1196711" cy="3413696"/>
+          </a:xfrm>
+          <a:prstGeom prst="rect">
+            <a:avLst/>
+          </a:prstGeom>
+        </p:spPr>
+      </p:pic>
+    </p:spTree>
+    <p:extLst>
+      <p:ext uri="{BB962C8B-B14F-4D97-AF65-F5344CB8AC3E}">
+        <p14:creationId xmlns:p14="http://schemas.microsoft.com/office/powerpoint/2010/main" val="3089249106"/>
+      </p:ext>
+    </p:extLst>
+  </p:cSld>
+  <p:clrMapOvr>
+    <a:masterClrMapping/>
+  </p:clrMapOvr>
+</p:sld>
+</file>
+
+<file path=ppt/slides/slide42.xml><?xml version="1.0" encoding="utf-8"?>
+<p:sld xmlns:a="http://schemas.openxmlformats.org/drawingml/2006/main" xmlns:r="http://schemas.openxmlformats.org/officeDocument/2006/relationships" xmlns:p="http://schemas.openxmlformats.org/presentationml/2006/main">
+  <p:cSld>
+    <p:spTree>
+      <p:nvGrpSpPr>
+        <p:cNvPr id="1" name=""/>
+        <p:cNvGrpSpPr/>
+        <p:nvPr/>
+      </p:nvGrpSpPr>
+      <p:grpSpPr>
+        <a:xfrm>
+          <a:off x="0" y="0"/>
+          <a:ext cx="0" cy="0"/>
+          <a:chOff x="0" y="0"/>
+          <a:chExt cx="0" cy="0"/>
+        </a:xfrm>
+      </p:grpSpPr>
+      <p:sp>
+        <p:nvSpPr>
+          <p:cNvPr id="2" name="Título 1">
+            <a:extLst>
+              <a:ext uri="{FF2B5EF4-FFF2-40B4-BE49-F238E27FC236}">
+                <a16:creationId xmlns:a16="http://schemas.microsoft.com/office/drawing/2014/main" id="{699DBA93-33D6-351E-0481-1AFB90151CC0}"/>
+              </a:ext>
+            </a:extLst>
+          </p:cNvPr>
+          <p:cNvSpPr>
+            <a:spLocks noGrp="1"/>
+          </p:cNvSpPr>
+          <p:nvPr>
+            <p:ph type="title"/>
+          </p:nvPr>
+        </p:nvSpPr>
+        <p:spPr/>
+        <p:txBody>
+          <a:bodyPr/>
+          <a:lstStyle/>
+          <a:p>
+            <a:r>
+              <a:rPr lang="es-ES" dirty="0"/>
+              <a:t>Ejemplo de mensaje</a:t>
+            </a:r>
+          </a:p>
+        </p:txBody>
+      </p:sp>
+      <p:sp>
+        <p:nvSpPr>
+          <p:cNvPr id="3" name="Marcador de contenido 2">
+            <a:extLst>
+              <a:ext uri="{FF2B5EF4-FFF2-40B4-BE49-F238E27FC236}">
+                <a16:creationId xmlns:a16="http://schemas.microsoft.com/office/drawing/2014/main" id="{6DB4D1E2-59B6-68AF-2048-74B77C976BD3}"/>
+              </a:ext>
+            </a:extLst>
+          </p:cNvPr>
+          <p:cNvSpPr>
+            <a:spLocks noGrp="1"/>
+          </p:cNvSpPr>
+          <p:nvPr>
+            <p:ph idx="1"/>
+          </p:nvPr>
+        </p:nvSpPr>
+        <p:spPr>
+          <a:xfrm>
+            <a:off x="581192" y="2180497"/>
+            <a:ext cx="11029615" cy="596260"/>
+          </a:xfrm>
+        </p:spPr>
+        <p:txBody>
+          <a:bodyPr>
+            <a:normAutofit lnSpcReduction="10000"/>
+          </a:bodyPr>
+          <a:lstStyle/>
+          <a:p>
+            <a:pPr algn="just"/>
+            <a:r>
+              <a:rPr lang="es-ES" dirty="0"/>
+              <a:t>Del </a:t>
+            </a:r>
+            <a:r>
+              <a:rPr lang="es-ES" dirty="0" err="1"/>
+              <a:t>Translator</a:t>
+            </a:r>
+            <a:r>
+              <a:rPr lang="es-ES" dirty="0"/>
+              <a:t> 3 saldrá el siguiente mensaje hacia la entrada del SMS Gateway, en el que enviaremos en el mensaje final, el teléfono del alumno junto con el nombre la asignatura y su calificación correspondiente</a:t>
+            </a:r>
+          </a:p>
+        </p:txBody>
+      </p:sp>
+      <p:pic>
+        <p:nvPicPr>
+          <p:cNvPr id="8" name="Imagen 7" descr="Texto&#10;&#10;Descripción generada automáticamente">
+            <a:extLst>
+              <a:ext uri="{FF2B5EF4-FFF2-40B4-BE49-F238E27FC236}">
+                <a16:creationId xmlns:a16="http://schemas.microsoft.com/office/drawing/2014/main" id="{321125DD-1B64-B5BB-0CCB-E86E1F20E483}"/>
+              </a:ext>
+            </a:extLst>
+          </p:cNvPr>
+          <p:cNvPicPr>
+            <a:picLocks noChangeAspect="1"/>
+          </p:cNvPicPr>
+          <p:nvPr/>
+        </p:nvPicPr>
+        <p:blipFill>
+          <a:blip r:embed="rId2"/>
+          <a:stretch>
+            <a:fillRect/>
+          </a:stretch>
+        </p:blipFill>
+        <p:spPr>
+          <a:xfrm>
+            <a:off x="747584" y="2952683"/>
+            <a:ext cx="10696831" cy="1566154"/>
+          </a:xfrm>
+          <a:prstGeom prst="rect">
+            <a:avLst/>
+          </a:prstGeom>
+        </p:spPr>
+      </p:pic>
+    </p:spTree>
+    <p:extLst>
+      <p:ext uri="{BB962C8B-B14F-4D97-AF65-F5344CB8AC3E}">
+        <p14:creationId xmlns:p14="http://schemas.microsoft.com/office/powerpoint/2010/main" val="1909711239"/>
+      </p:ext>
+    </p:extLst>
+  </p:cSld>
+  <p:clrMapOvr>
+    <a:masterClrMapping/>
+  </p:clrMapOvr>
+</p:sld>
+</file>
+
+<file path=ppt/slides/slide43.xml><?xml version="1.0" encoding="utf-8"?>
+<p:sld xmlns:a="http://schemas.openxmlformats.org/drawingml/2006/main" xmlns:r="http://schemas.openxmlformats.org/officeDocument/2006/relationships" xmlns:p="http://schemas.openxmlformats.org/presentationml/2006/main">
+  <p:cSld>
+    <p:spTree>
+      <p:nvGrpSpPr>
+        <p:cNvPr id="1" name=""/>
+        <p:cNvGrpSpPr/>
+        <p:nvPr/>
+      </p:nvGrpSpPr>
+      <p:grpSpPr>
+        <a:xfrm>
+          <a:off x="0" y="0"/>
+          <a:ext cx="0" cy="0"/>
+          <a:chOff x="0" y="0"/>
+          <a:chExt cx="0" cy="0"/>
+        </a:xfrm>
+      </p:grpSpPr>
+      <p:sp>
+        <p:nvSpPr>
+          <p:cNvPr id="2" name="Título 1">
+            <a:extLst>
+              <a:ext uri="{FF2B5EF4-FFF2-40B4-BE49-F238E27FC236}">
+                <a16:creationId xmlns:a16="http://schemas.microsoft.com/office/drawing/2014/main" id="{8D692F28-0EB3-DCB5-3631-5C098A06243D}"/>
+              </a:ext>
+            </a:extLst>
+          </p:cNvPr>
+          <p:cNvSpPr>
+            <a:spLocks noGrp="1"/>
+          </p:cNvSpPr>
+          <p:nvPr>
+            <p:ph type="title"/>
+          </p:nvPr>
+        </p:nvSpPr>
+        <p:spPr/>
+        <p:txBody>
+          <a:bodyPr>
+            <a:normAutofit/>
+          </a:bodyPr>
+          <a:lstStyle/>
+          <a:p>
+            <a:r>
+              <a:rPr lang="es-ES" sz="3200" dirty="0">
+                <a:sym typeface="Wingdings" panose="05000000000000000000" pitchFamily="2" charset="2"/>
+              </a:rPr>
+              <a:t>CONTEXT ENRICHER 2 TRANSLATOR 2</a:t>
+            </a:r>
+            <a:endParaRPr lang="es-ES" sz="3200" dirty="0"/>
+          </a:p>
+        </p:txBody>
+      </p:sp>
+      <p:sp>
+        <p:nvSpPr>
+          <p:cNvPr id="3" name="Marcador de texto 2">
+            <a:extLst>
+              <a:ext uri="{FF2B5EF4-FFF2-40B4-BE49-F238E27FC236}">
+                <a16:creationId xmlns:a16="http://schemas.microsoft.com/office/drawing/2014/main" id="{5B493C32-E059-9D76-B9C6-68E6600AAD06}"/>
+              </a:ext>
+            </a:extLst>
+          </p:cNvPr>
+          <p:cNvSpPr>
+            <a:spLocks noGrp="1"/>
+          </p:cNvSpPr>
+          <p:nvPr>
+            <p:ph type="body" idx="1"/>
+          </p:nvPr>
+        </p:nvSpPr>
+        <p:spPr/>
+        <p:txBody>
+          <a:bodyPr/>
+          <a:lstStyle/>
+          <a:p>
+            <a:r>
+              <a:rPr lang="es-ES" dirty="0"/>
+              <a:t>Ejemplo de mensaje</a:t>
+            </a:r>
+          </a:p>
+        </p:txBody>
+      </p:sp>
+      <p:pic>
+        <p:nvPicPr>
+          <p:cNvPr id="5" name="Imagen 4" descr="Interfaz de usuario gráfica, Aplicación&#10;&#10;Descripción generada automáticamente con confianza media">
+            <a:extLst>
+              <a:ext uri="{FF2B5EF4-FFF2-40B4-BE49-F238E27FC236}">
+                <a16:creationId xmlns:a16="http://schemas.microsoft.com/office/drawing/2014/main" id="{984F0027-C6EE-7C78-DF26-DEAB8A466871}"/>
+              </a:ext>
+            </a:extLst>
+          </p:cNvPr>
+          <p:cNvPicPr>
+            <a:picLocks noChangeAspect="1"/>
+          </p:cNvPicPr>
+          <p:nvPr/>
+        </p:nvPicPr>
+        <p:blipFill>
+          <a:blip r:embed="rId2"/>
+          <a:stretch>
+            <a:fillRect/>
+          </a:stretch>
+        </p:blipFill>
+        <p:spPr>
+          <a:xfrm>
+            <a:off x="4027354" y="643133"/>
+            <a:ext cx="4137292" cy="3207296"/>
+          </a:xfrm>
+          <a:prstGeom prst="rect">
+            <a:avLst/>
+          </a:prstGeom>
+        </p:spPr>
+      </p:pic>
+    </p:spTree>
+    <p:extLst>
+      <p:ext uri="{BB962C8B-B14F-4D97-AF65-F5344CB8AC3E}">
+        <p14:creationId xmlns:p14="http://schemas.microsoft.com/office/powerpoint/2010/main" val="113073816"/>
+      </p:ext>
+    </p:extLst>
+  </p:cSld>
+  <p:clrMapOvr>
+    <a:masterClrMapping/>
+  </p:clrMapOvr>
+</p:sld>
+</file>
+
+<file path=ppt/slides/slide44.xml><?xml version="1.0" encoding="utf-8"?>
+<p:sld xmlns:a="http://schemas.openxmlformats.org/drawingml/2006/main" xmlns:r="http://schemas.openxmlformats.org/officeDocument/2006/relationships" xmlns:p="http://schemas.openxmlformats.org/presentationml/2006/main">
+  <p:cSld>
+    <p:spTree>
+      <p:nvGrpSpPr>
+        <p:cNvPr id="1" name=""/>
+        <p:cNvGrpSpPr/>
+        <p:nvPr/>
+      </p:nvGrpSpPr>
+      <p:grpSpPr>
+        <a:xfrm>
+          <a:off x="0" y="0"/>
+          <a:ext cx="0" cy="0"/>
+          <a:chOff x="0" y="0"/>
+          <a:chExt cx="0" cy="0"/>
+        </a:xfrm>
+      </p:grpSpPr>
+      <p:sp>
+        <p:nvSpPr>
+          <p:cNvPr id="2" name="Título 1">
+            <a:extLst>
+              <a:ext uri="{FF2B5EF4-FFF2-40B4-BE49-F238E27FC236}">
+                <a16:creationId xmlns:a16="http://schemas.microsoft.com/office/drawing/2014/main" id="{699DBA93-33D6-351E-0481-1AFB90151CC0}"/>
+              </a:ext>
+            </a:extLst>
+          </p:cNvPr>
+          <p:cNvSpPr>
+            <a:spLocks noGrp="1"/>
+          </p:cNvSpPr>
+          <p:nvPr>
+            <p:ph type="title"/>
+          </p:nvPr>
+        </p:nvSpPr>
+        <p:spPr/>
+        <p:txBody>
+          <a:bodyPr/>
+          <a:lstStyle/>
+          <a:p>
+            <a:r>
+              <a:rPr lang="es-ES" dirty="0"/>
+              <a:t>Ejemplo de mensaje</a:t>
+            </a:r>
+          </a:p>
+        </p:txBody>
+      </p:sp>
+      <p:sp>
+        <p:nvSpPr>
+          <p:cNvPr id="3" name="Marcador de contenido 2">
+            <a:extLst>
+              <a:ext uri="{FF2B5EF4-FFF2-40B4-BE49-F238E27FC236}">
+                <a16:creationId xmlns:a16="http://schemas.microsoft.com/office/drawing/2014/main" id="{6DB4D1E2-59B6-68AF-2048-74B77C976BD3}"/>
+              </a:ext>
+            </a:extLst>
+          </p:cNvPr>
+          <p:cNvSpPr>
+            <a:spLocks noGrp="1"/>
+          </p:cNvSpPr>
+          <p:nvPr>
+            <p:ph idx="1"/>
+          </p:nvPr>
+        </p:nvSpPr>
+        <p:spPr>
+          <a:xfrm>
+            <a:off x="581192" y="2180497"/>
+            <a:ext cx="11029615" cy="596260"/>
+          </a:xfrm>
+        </p:spPr>
+        <p:txBody>
+          <a:bodyPr>
+            <a:normAutofit lnSpcReduction="10000"/>
+          </a:bodyPr>
+          <a:lstStyle/>
+          <a:p>
+            <a:pPr algn="just"/>
+            <a:r>
+              <a:rPr lang="es-ES" dirty="0"/>
+              <a:t>Del </a:t>
+            </a:r>
+            <a:r>
+              <a:rPr lang="es-ES" dirty="0" err="1"/>
+              <a:t>Context</a:t>
+            </a:r>
+            <a:r>
+              <a:rPr lang="es-ES" dirty="0"/>
+              <a:t> </a:t>
+            </a:r>
+            <a:r>
+              <a:rPr lang="es-ES" dirty="0" err="1"/>
+              <a:t>Enricher</a:t>
+            </a:r>
+            <a:r>
+              <a:rPr lang="es-ES" dirty="0"/>
+              <a:t> 2 saldrá el siguiente mensaje hacia la entrada del </a:t>
+            </a:r>
+            <a:r>
+              <a:rPr lang="es-ES" dirty="0" err="1"/>
+              <a:t>Translator</a:t>
+            </a:r>
+            <a:r>
+              <a:rPr lang="es-ES" dirty="0"/>
+              <a:t> 2, en el que enviaremos en el mensaje final, el correo del alumno junto con el nombre la asignatura y su calificación correspondiente</a:t>
+            </a:r>
+          </a:p>
+        </p:txBody>
+      </p:sp>
+      <p:pic>
+        <p:nvPicPr>
+          <p:cNvPr id="5" name="Imagen 4" descr="Texto&#10;&#10;Descripción generada automáticamente">
+            <a:extLst>
+              <a:ext uri="{FF2B5EF4-FFF2-40B4-BE49-F238E27FC236}">
+                <a16:creationId xmlns:a16="http://schemas.microsoft.com/office/drawing/2014/main" id="{539FCD5E-7F55-6EE0-9CC1-ABC7004D27E5}"/>
+              </a:ext>
+            </a:extLst>
+          </p:cNvPr>
+          <p:cNvPicPr>
+            <a:picLocks noChangeAspect="1"/>
+          </p:cNvPicPr>
+          <p:nvPr/>
+        </p:nvPicPr>
+        <p:blipFill>
+          <a:blip r:embed="rId2"/>
+          <a:stretch>
+            <a:fillRect/>
+          </a:stretch>
+        </p:blipFill>
+        <p:spPr>
+          <a:xfrm>
+            <a:off x="3467311" y="2776757"/>
+            <a:ext cx="5257376" cy="3582098"/>
+          </a:xfrm>
+          <a:prstGeom prst="rect">
+            <a:avLst/>
+          </a:prstGeom>
+        </p:spPr>
+      </p:pic>
+    </p:spTree>
+    <p:extLst>
+      <p:ext uri="{BB962C8B-B14F-4D97-AF65-F5344CB8AC3E}">
+        <p14:creationId xmlns:p14="http://schemas.microsoft.com/office/powerpoint/2010/main" val="3505550233"/>
+      </p:ext>
+    </p:extLst>
+  </p:cSld>
+  <p:clrMapOvr>
+    <a:masterClrMapping/>
+  </p:clrMapOvr>
+</p:sld>
+</file>
+
+<file path=ppt/slides/slide45.xml><?xml version="1.0" encoding="utf-8"?>
+<p:sld xmlns:a="http://schemas.openxmlformats.org/drawingml/2006/main" xmlns:r="http://schemas.openxmlformats.org/officeDocument/2006/relationships" xmlns:p="http://schemas.openxmlformats.org/presentationml/2006/main">
+  <p:cSld>
+    <p:spTree>
+      <p:nvGrpSpPr>
+        <p:cNvPr id="1" name=""/>
+        <p:cNvGrpSpPr/>
+        <p:nvPr/>
+      </p:nvGrpSpPr>
+      <p:grpSpPr>
+        <a:xfrm>
+          <a:off x="0" y="0"/>
+          <a:ext cx="0" cy="0"/>
+          <a:chOff x="0" y="0"/>
+          <a:chExt cx="0" cy="0"/>
+        </a:xfrm>
+      </p:grpSpPr>
+      <p:sp>
+        <p:nvSpPr>
+          <p:cNvPr id="2" name="Título 1">
+            <a:extLst>
+              <a:ext uri="{FF2B5EF4-FFF2-40B4-BE49-F238E27FC236}">
+                <a16:creationId xmlns:a16="http://schemas.microsoft.com/office/drawing/2014/main" id="{8D692F28-0EB3-DCB5-3631-5C098A06243D}"/>
+              </a:ext>
+            </a:extLst>
+          </p:cNvPr>
+          <p:cNvSpPr>
+            <a:spLocks noGrp="1"/>
+          </p:cNvSpPr>
+          <p:nvPr>
+            <p:ph type="title"/>
+          </p:nvPr>
+        </p:nvSpPr>
+        <p:spPr/>
+        <p:txBody>
+          <a:bodyPr>
+            <a:normAutofit/>
+          </a:bodyPr>
+          <a:lstStyle/>
+          <a:p>
+            <a:r>
+              <a:rPr lang="es-ES" sz="3200" dirty="0">
+                <a:sym typeface="Wingdings" panose="05000000000000000000" pitchFamily="2" charset="2"/>
+              </a:rPr>
+              <a:t>TRANSLATOR 2  Mail </a:t>
+            </a:r>
+            <a:r>
+              <a:rPr lang="es-ES" sz="3200" dirty="0" err="1">
+                <a:sym typeface="Wingdings" panose="05000000000000000000" pitchFamily="2" charset="2"/>
+              </a:rPr>
+              <a:t>gateway</a:t>
+            </a:r>
+            <a:endParaRPr lang="es-ES" sz="3200" dirty="0"/>
+          </a:p>
+        </p:txBody>
+      </p:sp>
+      <p:sp>
+        <p:nvSpPr>
+          <p:cNvPr id="3" name="Marcador de texto 2">
+            <a:extLst>
+              <a:ext uri="{FF2B5EF4-FFF2-40B4-BE49-F238E27FC236}">
+                <a16:creationId xmlns:a16="http://schemas.microsoft.com/office/drawing/2014/main" id="{5B493C32-E059-9D76-B9C6-68E6600AAD06}"/>
+              </a:ext>
+            </a:extLst>
+          </p:cNvPr>
+          <p:cNvSpPr>
+            <a:spLocks noGrp="1"/>
+          </p:cNvSpPr>
+          <p:nvPr>
+            <p:ph type="body" idx="1"/>
+          </p:nvPr>
+        </p:nvSpPr>
+        <p:spPr/>
+        <p:txBody>
+          <a:bodyPr/>
+          <a:lstStyle/>
+          <a:p>
+            <a:r>
+              <a:rPr lang="es-ES" dirty="0"/>
+              <a:t>Ejemplo de mensaje</a:t>
+            </a:r>
+          </a:p>
+        </p:txBody>
+      </p:sp>
+      <p:pic>
+        <p:nvPicPr>
+          <p:cNvPr id="6" name="Imagen 5" descr="Diagrama&#10;&#10;Descripción generada automáticamente">
+            <a:extLst>
+              <a:ext uri="{FF2B5EF4-FFF2-40B4-BE49-F238E27FC236}">
+                <a16:creationId xmlns:a16="http://schemas.microsoft.com/office/drawing/2014/main" id="{9B7B9811-0AA1-FE93-584C-6DA56B40E353}"/>
+              </a:ext>
+            </a:extLst>
+          </p:cNvPr>
+          <p:cNvPicPr>
+            <a:picLocks noChangeAspect="1"/>
+          </p:cNvPicPr>
+          <p:nvPr/>
+        </p:nvPicPr>
+        <p:blipFill>
+          <a:blip r:embed="rId2"/>
+          <a:stretch>
+            <a:fillRect/>
+          </a:stretch>
+        </p:blipFill>
+        <p:spPr>
+          <a:xfrm>
+            <a:off x="5155511" y="655964"/>
+            <a:ext cx="1880978" cy="3370086"/>
+          </a:xfrm>
+          <a:prstGeom prst="rect">
+            <a:avLst/>
+          </a:prstGeom>
+        </p:spPr>
+      </p:pic>
+    </p:spTree>
+    <p:extLst>
+      <p:ext uri="{BB962C8B-B14F-4D97-AF65-F5344CB8AC3E}">
+        <p14:creationId xmlns:p14="http://schemas.microsoft.com/office/powerpoint/2010/main" val="1030332868"/>
+      </p:ext>
+    </p:extLst>
+  </p:cSld>
+  <p:clrMapOvr>
+    <a:masterClrMapping/>
+  </p:clrMapOvr>
+</p:sld>
+</file>
+
+<file path=ppt/slides/slide46.xml><?xml version="1.0" encoding="utf-8"?>
+<p:sld xmlns:a="http://schemas.openxmlformats.org/drawingml/2006/main" xmlns:r="http://schemas.openxmlformats.org/officeDocument/2006/relationships" xmlns:p="http://schemas.openxmlformats.org/presentationml/2006/main">
+  <p:cSld>
+    <p:spTree>
+      <p:nvGrpSpPr>
+        <p:cNvPr id="1" name=""/>
+        <p:cNvGrpSpPr/>
+        <p:nvPr/>
+      </p:nvGrpSpPr>
+      <p:grpSpPr>
+        <a:xfrm>
+          <a:off x="0" y="0"/>
+          <a:ext cx="0" cy="0"/>
+          <a:chOff x="0" y="0"/>
+          <a:chExt cx="0" cy="0"/>
+        </a:xfrm>
+      </p:grpSpPr>
+      <p:sp>
+        <p:nvSpPr>
+          <p:cNvPr id="2" name="Título 1">
+            <a:extLst>
+              <a:ext uri="{FF2B5EF4-FFF2-40B4-BE49-F238E27FC236}">
+                <a16:creationId xmlns:a16="http://schemas.microsoft.com/office/drawing/2014/main" id="{699DBA93-33D6-351E-0481-1AFB90151CC0}"/>
+              </a:ext>
+            </a:extLst>
+          </p:cNvPr>
+          <p:cNvSpPr>
+            <a:spLocks noGrp="1"/>
+          </p:cNvSpPr>
+          <p:nvPr>
+            <p:ph type="title"/>
+          </p:nvPr>
+        </p:nvSpPr>
+        <p:spPr/>
+        <p:txBody>
+          <a:bodyPr/>
+          <a:lstStyle/>
+          <a:p>
+            <a:r>
+              <a:rPr lang="es-ES" dirty="0"/>
+              <a:t>Ejemplo de mensaje</a:t>
+            </a:r>
+          </a:p>
+        </p:txBody>
+      </p:sp>
+      <p:sp>
+        <p:nvSpPr>
+          <p:cNvPr id="3" name="Marcador de contenido 2">
+            <a:extLst>
+              <a:ext uri="{FF2B5EF4-FFF2-40B4-BE49-F238E27FC236}">
+                <a16:creationId xmlns:a16="http://schemas.microsoft.com/office/drawing/2014/main" id="{6DB4D1E2-59B6-68AF-2048-74B77C976BD3}"/>
+              </a:ext>
+            </a:extLst>
+          </p:cNvPr>
+          <p:cNvSpPr>
+            <a:spLocks noGrp="1"/>
+          </p:cNvSpPr>
+          <p:nvPr>
+            <p:ph idx="1"/>
+          </p:nvPr>
+        </p:nvSpPr>
+        <p:spPr>
+          <a:xfrm>
+            <a:off x="581192" y="2180497"/>
+            <a:ext cx="11029615" cy="596260"/>
+          </a:xfrm>
+        </p:spPr>
+        <p:txBody>
+          <a:bodyPr>
+            <a:normAutofit lnSpcReduction="10000"/>
+          </a:bodyPr>
+          <a:lstStyle/>
+          <a:p>
+            <a:pPr algn="just"/>
+            <a:r>
+              <a:rPr lang="es-ES" dirty="0"/>
+              <a:t>Del </a:t>
+            </a:r>
+            <a:r>
+              <a:rPr lang="es-ES" dirty="0" err="1"/>
+              <a:t>Translator</a:t>
+            </a:r>
+            <a:r>
+              <a:rPr lang="es-ES" dirty="0"/>
+              <a:t> 2 saldrá el siguiente mensaje hacia la entrada del Mail Gateway, en el que traduciremos el mensaje a un formato que sea capaz de interpretar el sistema MAIL Gateway</a:t>
+            </a:r>
+          </a:p>
+        </p:txBody>
+      </p:sp>
+      <p:pic>
+        <p:nvPicPr>
+          <p:cNvPr id="6" name="Imagen 5" descr="Interfaz de usuario gráfica, Texto, Aplicación&#10;&#10;Descripción generada automáticamente">
+            <a:extLst>
+              <a:ext uri="{FF2B5EF4-FFF2-40B4-BE49-F238E27FC236}">
+                <a16:creationId xmlns:a16="http://schemas.microsoft.com/office/drawing/2014/main" id="{2983A2EA-E993-30C3-D137-40E402501DF0}"/>
+              </a:ext>
+            </a:extLst>
+          </p:cNvPr>
+          <p:cNvPicPr>
+            <a:picLocks noChangeAspect="1"/>
+          </p:cNvPicPr>
+          <p:nvPr/>
+        </p:nvPicPr>
+        <p:blipFill>
+          <a:blip r:embed="rId2"/>
+          <a:stretch>
+            <a:fillRect/>
+          </a:stretch>
+        </p:blipFill>
+        <p:spPr>
+          <a:xfrm>
+            <a:off x="854448" y="3026750"/>
+            <a:ext cx="10483104" cy="1513351"/>
+          </a:xfrm>
+          <a:prstGeom prst="rect">
+            <a:avLst/>
+          </a:prstGeom>
+        </p:spPr>
+      </p:pic>
+    </p:spTree>
+    <p:extLst>
+      <p:ext uri="{BB962C8B-B14F-4D97-AF65-F5344CB8AC3E}">
+        <p14:creationId xmlns:p14="http://schemas.microsoft.com/office/powerpoint/2010/main" val="77823903"/>
       </p:ext>
     </p:extLst>
   </p:cSld>

</xml_diff>